<commit_message>
28 diapositivas en el PowerPoint
</commit_message>
<xml_diff>
--- a/Recetatic/Visual C#.pptx
+++ b/Recetatic/Visual C#.pptx
@@ -12,8 +12,27 @@
     <p:sldId id="261" r:id="rId6"/>
     <p:sldId id="263" r:id="rId7"/>
     <p:sldId id="264" r:id="rId8"/>
-    <p:sldId id="260" r:id="rId9"/>
-    <p:sldId id="262" r:id="rId10"/>
+    <p:sldId id="277" r:id="rId9"/>
+    <p:sldId id="278" r:id="rId10"/>
+    <p:sldId id="262" r:id="rId11"/>
+    <p:sldId id="265" r:id="rId12"/>
+    <p:sldId id="260" r:id="rId13"/>
+    <p:sldId id="266" r:id="rId14"/>
+    <p:sldId id="267" r:id="rId15"/>
+    <p:sldId id="268" r:id="rId16"/>
+    <p:sldId id="269" r:id="rId17"/>
+    <p:sldId id="270" r:id="rId18"/>
+    <p:sldId id="271" r:id="rId19"/>
+    <p:sldId id="272" r:id="rId20"/>
+    <p:sldId id="273" r:id="rId21"/>
+    <p:sldId id="274" r:id="rId22"/>
+    <p:sldId id="275" r:id="rId23"/>
+    <p:sldId id="276" r:id="rId24"/>
+    <p:sldId id="279" r:id="rId25"/>
+    <p:sldId id="280" r:id="rId26"/>
+    <p:sldId id="281" r:id="rId27"/>
+    <p:sldId id="282" r:id="rId28"/>
+    <p:sldId id="283" r:id="rId29"/>
   </p:sldIdLst>
   <p:sldSz cx="12192000" cy="6858000"/>
   <p:notesSz cx="6858000" cy="9144000"/>
@@ -267,7 +286,7 @@
           <a:p>
             <a:fld id="{90424BB1-9CF4-4048-A389-4865E6DD34BD}" type="datetimeFigureOut">
               <a:rPr lang="es-ES" smtClean="0"/>
-              <a:t>10/11/2020</a:t>
+              <a:t>11/11/2020</a:t>
             </a:fld>
             <a:endParaRPr lang="es-ES"/>
           </a:p>
@@ -465,7 +484,7 @@
           <a:p>
             <a:fld id="{90424BB1-9CF4-4048-A389-4865E6DD34BD}" type="datetimeFigureOut">
               <a:rPr lang="es-ES" smtClean="0"/>
-              <a:t>10/11/2020</a:t>
+              <a:t>11/11/2020</a:t>
             </a:fld>
             <a:endParaRPr lang="es-ES"/>
           </a:p>
@@ -673,7 +692,7 @@
           <a:p>
             <a:fld id="{90424BB1-9CF4-4048-A389-4865E6DD34BD}" type="datetimeFigureOut">
               <a:rPr lang="es-ES" smtClean="0"/>
-              <a:t>10/11/2020</a:t>
+              <a:t>11/11/2020</a:t>
             </a:fld>
             <a:endParaRPr lang="es-ES"/>
           </a:p>
@@ -871,7 +890,7 @@
           <a:p>
             <a:fld id="{90424BB1-9CF4-4048-A389-4865E6DD34BD}" type="datetimeFigureOut">
               <a:rPr lang="es-ES" smtClean="0"/>
-              <a:t>10/11/2020</a:t>
+              <a:t>11/11/2020</a:t>
             </a:fld>
             <a:endParaRPr lang="es-ES"/>
           </a:p>
@@ -1146,7 +1165,7 @@
           <a:p>
             <a:fld id="{90424BB1-9CF4-4048-A389-4865E6DD34BD}" type="datetimeFigureOut">
               <a:rPr lang="es-ES" smtClean="0"/>
-              <a:t>10/11/2020</a:t>
+              <a:t>11/11/2020</a:t>
             </a:fld>
             <a:endParaRPr lang="es-ES"/>
           </a:p>
@@ -1411,7 +1430,7 @@
           <a:p>
             <a:fld id="{90424BB1-9CF4-4048-A389-4865E6DD34BD}" type="datetimeFigureOut">
               <a:rPr lang="es-ES" smtClean="0"/>
-              <a:t>10/11/2020</a:t>
+              <a:t>11/11/2020</a:t>
             </a:fld>
             <a:endParaRPr lang="es-ES"/>
           </a:p>
@@ -1823,7 +1842,7 @@
           <a:p>
             <a:fld id="{90424BB1-9CF4-4048-A389-4865E6DD34BD}" type="datetimeFigureOut">
               <a:rPr lang="es-ES" smtClean="0"/>
-              <a:t>10/11/2020</a:t>
+              <a:t>11/11/2020</a:t>
             </a:fld>
             <a:endParaRPr lang="es-ES"/>
           </a:p>
@@ -1964,7 +1983,7 @@
           <a:p>
             <a:fld id="{90424BB1-9CF4-4048-A389-4865E6DD34BD}" type="datetimeFigureOut">
               <a:rPr lang="es-ES" smtClean="0"/>
-              <a:t>10/11/2020</a:t>
+              <a:t>11/11/2020</a:t>
             </a:fld>
             <a:endParaRPr lang="es-ES"/>
           </a:p>
@@ -2077,7 +2096,7 @@
           <a:p>
             <a:fld id="{90424BB1-9CF4-4048-A389-4865E6DD34BD}" type="datetimeFigureOut">
               <a:rPr lang="es-ES" smtClean="0"/>
-              <a:t>10/11/2020</a:t>
+              <a:t>11/11/2020</a:t>
             </a:fld>
             <a:endParaRPr lang="es-ES"/>
           </a:p>
@@ -2388,7 +2407,7 @@
           <a:p>
             <a:fld id="{90424BB1-9CF4-4048-A389-4865E6DD34BD}" type="datetimeFigureOut">
               <a:rPr lang="es-ES" smtClean="0"/>
-              <a:t>10/11/2020</a:t>
+              <a:t>11/11/2020</a:t>
             </a:fld>
             <a:endParaRPr lang="es-ES"/>
           </a:p>
@@ -2676,7 +2695,7 @@
           <a:p>
             <a:fld id="{90424BB1-9CF4-4048-A389-4865E6DD34BD}" type="datetimeFigureOut">
               <a:rPr lang="es-ES" smtClean="0"/>
-              <a:t>10/11/2020</a:t>
+              <a:t>11/11/2020</a:t>
             </a:fld>
             <a:endParaRPr lang="es-ES"/>
           </a:p>
@@ -2917,7 +2936,7 @@
           <a:p>
             <a:fld id="{90424BB1-9CF4-4048-A389-4865E6DD34BD}" type="datetimeFigureOut">
               <a:rPr lang="es-ES" smtClean="0"/>
-              <a:t>10/11/2020</a:t>
+              <a:t>11/11/2020</a:t>
             </a:fld>
             <a:endParaRPr lang="es-ES"/>
           </a:p>
@@ -3409,6 +3428,1983 @@
 </p:sld>
 </file>
 
+<file path=ppt/slides/slide10.xml><?xml version="1.0" encoding="utf-8"?>
+<p:sld xmlns:a="http://schemas.openxmlformats.org/drawingml/2006/main" xmlns:r="http://schemas.openxmlformats.org/officeDocument/2006/relationships" xmlns:p="http://schemas.openxmlformats.org/presentationml/2006/main">
+  <p:cSld>
+    <p:spTree>
+      <p:nvGrpSpPr>
+        <p:cNvPr id="1" name=""/>
+        <p:cNvGrpSpPr/>
+        <p:nvPr/>
+      </p:nvGrpSpPr>
+      <p:grpSpPr>
+        <a:xfrm>
+          <a:off x="0" y="0"/>
+          <a:ext cx="0" cy="0"/>
+          <a:chOff x="0" y="0"/>
+          <a:chExt cx="0" cy="0"/>
+        </a:xfrm>
+      </p:grpSpPr>
+      <p:sp>
+        <p:nvSpPr>
+          <p:cNvPr id="2" name="Título 1">
+            <a:extLst>
+              <a:ext uri="{FF2B5EF4-FFF2-40B4-BE49-F238E27FC236}">
+                <a16:creationId xmlns:a16="http://schemas.microsoft.com/office/drawing/2014/main" id="{3CB263F5-9B46-4C95-B7C7-D81031CAD697}"/>
+              </a:ext>
+            </a:extLst>
+          </p:cNvPr>
+          <p:cNvSpPr>
+            <a:spLocks noGrp="1"/>
+          </p:cNvSpPr>
+          <p:nvPr>
+            <p:ph type="title"/>
+          </p:nvPr>
+        </p:nvSpPr>
+        <p:spPr/>
+        <p:txBody>
+          <a:bodyPr/>
+          <a:lstStyle/>
+          <a:p>
+            <a:r>
+              <a:rPr lang="es-ES" dirty="0"/>
+              <a:t>Conversiones (Vídeos 6, 7, 8 y 13)</a:t>
+            </a:r>
+          </a:p>
+        </p:txBody>
+      </p:sp>
+      <p:sp>
+        <p:nvSpPr>
+          <p:cNvPr id="3" name="Marcador de contenido 2">
+            <a:extLst>
+              <a:ext uri="{FF2B5EF4-FFF2-40B4-BE49-F238E27FC236}">
+                <a16:creationId xmlns:a16="http://schemas.microsoft.com/office/drawing/2014/main" id="{C46822C3-84A6-4AA0-AC3F-0A1AD9C172F6}"/>
+              </a:ext>
+            </a:extLst>
+          </p:cNvPr>
+          <p:cNvSpPr>
+            <a:spLocks noGrp="1"/>
+          </p:cNvSpPr>
+          <p:nvPr>
+            <p:ph idx="1"/>
+          </p:nvPr>
+        </p:nvSpPr>
+        <p:spPr/>
+        <p:txBody>
+          <a:bodyPr/>
+          <a:lstStyle/>
+          <a:p>
+            <a:r>
+              <a:rPr lang="es-ES" dirty="0"/>
+              <a:t>Convierte una variable de tipo </a:t>
+            </a:r>
+            <a:r>
+              <a:rPr lang="es-ES" b="1" dirty="0"/>
+              <a:t>número</a:t>
+            </a:r>
+            <a:r>
+              <a:rPr lang="es-ES" dirty="0"/>
+              <a:t> a </a:t>
+            </a:r>
+            <a:r>
+              <a:rPr lang="es-ES" b="1" dirty="0" err="1"/>
+              <a:t>string</a:t>
+            </a:r>
+            <a:r>
+              <a:rPr lang="es-ES" dirty="0"/>
+              <a:t>:</a:t>
+            </a:r>
+          </a:p>
+          <a:p>
+            <a:pPr marL="457200" lvl="1" indent="0">
+              <a:buNone/>
+            </a:pPr>
+            <a:r>
+              <a:rPr lang="es-ES" i="1" dirty="0"/>
+              <a:t>&lt;nombre de variable&gt;.</a:t>
+            </a:r>
+            <a:r>
+              <a:rPr lang="es-ES" i="1" dirty="0" err="1"/>
+              <a:t>ToString</a:t>
+            </a:r>
+            <a:r>
+              <a:rPr lang="es-ES" i="1" dirty="0"/>
+              <a:t>();</a:t>
+            </a:r>
+          </a:p>
+          <a:p>
+            <a:r>
+              <a:rPr lang="es-ES" dirty="0"/>
+              <a:t>Convierte una variable de tipo </a:t>
+            </a:r>
+            <a:r>
+              <a:rPr lang="es-ES" b="1" dirty="0" err="1"/>
+              <a:t>bool</a:t>
+            </a:r>
+            <a:r>
+              <a:rPr lang="es-ES" dirty="0"/>
+              <a:t> a </a:t>
+            </a:r>
+            <a:r>
+              <a:rPr lang="es-ES" b="1" dirty="0" err="1"/>
+              <a:t>string</a:t>
+            </a:r>
+            <a:r>
+              <a:rPr lang="es-ES" dirty="0"/>
+              <a:t>:</a:t>
+            </a:r>
+          </a:p>
+          <a:p>
+            <a:pPr marL="457200" lvl="1" indent="0">
+              <a:buNone/>
+            </a:pPr>
+            <a:r>
+              <a:rPr lang="es-ES" i="1" dirty="0"/>
+              <a:t>&lt;nombre de variable&gt;.</a:t>
+            </a:r>
+            <a:r>
+              <a:rPr lang="es-ES" i="1" dirty="0" err="1"/>
+              <a:t>ToString</a:t>
+            </a:r>
+            <a:r>
+              <a:rPr lang="es-ES" i="1" dirty="0"/>
+              <a:t>();</a:t>
+            </a:r>
+          </a:p>
+          <a:p>
+            <a:r>
+              <a:rPr lang="es-ES" dirty="0"/>
+              <a:t>Convierte una variable de tipo </a:t>
+            </a:r>
+            <a:r>
+              <a:rPr lang="es-ES" b="1" dirty="0" err="1"/>
+              <a:t>DateTime</a:t>
+            </a:r>
+            <a:r>
+              <a:rPr lang="es-ES" b="1" dirty="0"/>
+              <a:t> </a:t>
+            </a:r>
+            <a:r>
+              <a:rPr lang="es-ES" dirty="0"/>
+              <a:t>a </a:t>
+            </a:r>
+            <a:r>
+              <a:rPr lang="es-ES" b="1" dirty="0" err="1"/>
+              <a:t>string</a:t>
+            </a:r>
+            <a:r>
+              <a:rPr lang="es-ES" dirty="0"/>
+              <a:t>:</a:t>
+            </a:r>
+          </a:p>
+          <a:p>
+            <a:pPr marL="457200" lvl="1" indent="0">
+              <a:buNone/>
+            </a:pPr>
+            <a:r>
+              <a:rPr lang="es-ES" i="1" dirty="0"/>
+              <a:t>&lt;nombre de variable&gt;.</a:t>
+            </a:r>
+            <a:r>
+              <a:rPr lang="es-ES" i="1" dirty="0" err="1"/>
+              <a:t>ToString</a:t>
+            </a:r>
+            <a:r>
+              <a:rPr lang="es-ES" i="1" dirty="0"/>
+              <a:t>();</a:t>
+            </a:r>
+          </a:p>
+          <a:p>
+            <a:r>
+              <a:rPr lang="es-ES" dirty="0"/>
+              <a:t>Para convertir una variable de tipo texto a otro tipo de dato se usa:</a:t>
+            </a:r>
+          </a:p>
+          <a:p>
+            <a:pPr marL="457200" lvl="1" indent="0">
+              <a:buNone/>
+            </a:pPr>
+            <a:r>
+              <a:rPr lang="es-ES" i="1" dirty="0" err="1"/>
+              <a:t>Convert.Toxxx</a:t>
+            </a:r>
+            <a:r>
+              <a:rPr lang="es-ES" i="1" dirty="0"/>
+              <a:t>(&lt;variable de tipo </a:t>
+            </a:r>
+            <a:r>
+              <a:rPr lang="es-ES" i="1" dirty="0" err="1"/>
+              <a:t>string</a:t>
+            </a:r>
+            <a:r>
+              <a:rPr lang="es-ES" i="1" dirty="0"/>
+              <a:t>&gt;)</a:t>
+            </a:r>
+          </a:p>
+          <a:p>
+            <a:pPr marL="457200" lvl="1" indent="0">
+              <a:buNone/>
+            </a:pPr>
+            <a:r>
+              <a:rPr lang="es-ES" dirty="0"/>
+              <a:t>Donde </a:t>
+            </a:r>
+            <a:r>
+              <a:rPr lang="es-ES" dirty="0" err="1"/>
+              <a:t>xxx</a:t>
+            </a:r>
+            <a:r>
+              <a:rPr lang="es-ES" dirty="0"/>
+              <a:t> puede ser </a:t>
+            </a:r>
+            <a:r>
+              <a:rPr lang="es-ES" b="1" dirty="0"/>
+              <a:t>byte</a:t>
+            </a:r>
+            <a:r>
+              <a:rPr lang="es-ES" dirty="0"/>
+              <a:t>, </a:t>
+            </a:r>
+            <a:r>
+              <a:rPr lang="es-ES" b="1" dirty="0" err="1"/>
+              <a:t>int</a:t>
+            </a:r>
+            <a:r>
+              <a:rPr lang="es-ES" dirty="0"/>
+              <a:t>, </a:t>
+            </a:r>
+            <a:r>
+              <a:rPr lang="es-ES" b="1" dirty="0"/>
+              <a:t>double</a:t>
+            </a:r>
+            <a:r>
+              <a:rPr lang="es-ES" dirty="0"/>
+              <a:t>, </a:t>
+            </a:r>
+            <a:r>
+              <a:rPr lang="es-ES" b="1" dirty="0" err="1"/>
+              <a:t>DateTime</a:t>
+            </a:r>
+            <a:r>
+              <a:rPr lang="es-ES" dirty="0"/>
+              <a:t>, etc.</a:t>
+            </a:r>
+            <a:endParaRPr lang="es-ES" b="1" dirty="0"/>
+          </a:p>
+          <a:p>
+            <a:endParaRPr lang="es-ES" dirty="0"/>
+          </a:p>
+          <a:p>
+            <a:endParaRPr lang="es-ES" dirty="0"/>
+          </a:p>
+        </p:txBody>
+      </p:sp>
+    </p:spTree>
+    <p:extLst>
+      <p:ext uri="{BB962C8B-B14F-4D97-AF65-F5344CB8AC3E}">
+        <p14:creationId xmlns:p14="http://schemas.microsoft.com/office/powerpoint/2010/main" val="2593939620"/>
+      </p:ext>
+    </p:extLst>
+  </p:cSld>
+  <p:clrMapOvr>
+    <a:masterClrMapping/>
+  </p:clrMapOvr>
+</p:sld>
+</file>
+
+<file path=ppt/slides/slide11.xml><?xml version="1.0" encoding="utf-8"?>
+<p:sld xmlns:a="http://schemas.openxmlformats.org/drawingml/2006/main" xmlns:r="http://schemas.openxmlformats.org/officeDocument/2006/relationships" xmlns:p="http://schemas.openxmlformats.org/presentationml/2006/main">
+  <p:cSld>
+    <p:spTree>
+      <p:nvGrpSpPr>
+        <p:cNvPr id="1" name=""/>
+        <p:cNvGrpSpPr/>
+        <p:nvPr/>
+      </p:nvGrpSpPr>
+      <p:grpSpPr>
+        <a:xfrm>
+          <a:off x="0" y="0"/>
+          <a:ext cx="0" cy="0"/>
+          <a:chOff x="0" y="0"/>
+          <a:chExt cx="0" cy="0"/>
+        </a:xfrm>
+      </p:grpSpPr>
+      <p:sp>
+        <p:nvSpPr>
+          <p:cNvPr id="2" name="Título 1">
+            <a:extLst>
+              <a:ext uri="{FF2B5EF4-FFF2-40B4-BE49-F238E27FC236}">
+                <a16:creationId xmlns:a16="http://schemas.microsoft.com/office/drawing/2014/main" id="{BBEFD776-AE67-4009-A52C-F38227FBBD76}"/>
+              </a:ext>
+            </a:extLst>
+          </p:cNvPr>
+          <p:cNvSpPr>
+            <a:spLocks noGrp="1"/>
+          </p:cNvSpPr>
+          <p:nvPr>
+            <p:ph type="title"/>
+          </p:nvPr>
+        </p:nvSpPr>
+        <p:spPr/>
+        <p:txBody>
+          <a:bodyPr/>
+          <a:lstStyle/>
+          <a:p>
+            <a:r>
+              <a:rPr lang="es-ES" dirty="0"/>
+              <a:t>Constantes (Vídeo 10)</a:t>
+            </a:r>
+          </a:p>
+        </p:txBody>
+      </p:sp>
+      <p:sp>
+        <p:nvSpPr>
+          <p:cNvPr id="3" name="Marcador de contenido 2">
+            <a:extLst>
+              <a:ext uri="{FF2B5EF4-FFF2-40B4-BE49-F238E27FC236}">
+                <a16:creationId xmlns:a16="http://schemas.microsoft.com/office/drawing/2014/main" id="{1ECF8528-405D-4F37-B0AE-3EE7D9ED2BF4}"/>
+              </a:ext>
+            </a:extLst>
+          </p:cNvPr>
+          <p:cNvSpPr>
+            <a:spLocks noGrp="1"/>
+          </p:cNvSpPr>
+          <p:nvPr>
+            <p:ph idx="1"/>
+          </p:nvPr>
+        </p:nvSpPr>
+        <p:spPr/>
+        <p:txBody>
+          <a:bodyPr/>
+          <a:lstStyle/>
+          <a:p>
+            <a:r>
+              <a:rPr lang="es-ES" dirty="0"/>
+              <a:t>La definición de una constante se hace así:</a:t>
+            </a:r>
+          </a:p>
+          <a:p>
+            <a:pPr marL="457200" lvl="1" indent="0">
+              <a:buNone/>
+            </a:pPr>
+            <a:r>
+              <a:rPr lang="es-ES" i="1" dirty="0" err="1"/>
+              <a:t>const</a:t>
+            </a:r>
+            <a:r>
+              <a:rPr lang="es-ES" i="1" dirty="0"/>
+              <a:t> &lt;tipo de dato&gt; &lt;nombre de la constante&gt; = &lt;valor&gt;;</a:t>
+            </a:r>
+          </a:p>
+          <a:p>
+            <a:pPr marL="457200" lvl="1" indent="0">
+              <a:buNone/>
+            </a:pPr>
+            <a:endParaRPr lang="es-ES" i="1" dirty="0"/>
+          </a:p>
+        </p:txBody>
+      </p:sp>
+    </p:spTree>
+    <p:extLst>
+      <p:ext uri="{BB962C8B-B14F-4D97-AF65-F5344CB8AC3E}">
+        <p14:creationId xmlns:p14="http://schemas.microsoft.com/office/powerpoint/2010/main" val="696788397"/>
+      </p:ext>
+    </p:extLst>
+  </p:cSld>
+  <p:clrMapOvr>
+    <a:masterClrMapping/>
+  </p:clrMapOvr>
+</p:sld>
+</file>
+
+<file path=ppt/slides/slide12.xml><?xml version="1.0" encoding="utf-8"?>
+<p:sld xmlns:a="http://schemas.openxmlformats.org/drawingml/2006/main" xmlns:r="http://schemas.openxmlformats.org/officeDocument/2006/relationships" xmlns:p="http://schemas.openxmlformats.org/presentationml/2006/main">
+  <p:cSld>
+    <p:spTree>
+      <p:nvGrpSpPr>
+        <p:cNvPr id="1" name=""/>
+        <p:cNvGrpSpPr/>
+        <p:nvPr/>
+      </p:nvGrpSpPr>
+      <p:grpSpPr>
+        <a:xfrm>
+          <a:off x="0" y="0"/>
+          <a:ext cx="0" cy="0"/>
+          <a:chOff x="0" y="0"/>
+          <a:chExt cx="0" cy="0"/>
+        </a:xfrm>
+      </p:grpSpPr>
+      <p:sp>
+        <p:nvSpPr>
+          <p:cNvPr id="2" name="Título 1">
+            <a:extLst>
+              <a:ext uri="{FF2B5EF4-FFF2-40B4-BE49-F238E27FC236}">
+                <a16:creationId xmlns:a16="http://schemas.microsoft.com/office/drawing/2014/main" id="{6BFFADDD-9AF8-49AB-8B56-3055F2DEB8FD}"/>
+              </a:ext>
+            </a:extLst>
+          </p:cNvPr>
+          <p:cNvSpPr>
+            <a:spLocks noGrp="1"/>
+          </p:cNvSpPr>
+          <p:nvPr>
+            <p:ph type="title"/>
+          </p:nvPr>
+        </p:nvSpPr>
+        <p:spPr/>
+        <p:txBody>
+          <a:bodyPr/>
+          <a:lstStyle/>
+          <a:p>
+            <a:r>
+              <a:rPr lang="es-ES" dirty="0"/>
+              <a:t>Mostrar mensaje (Vídeo 4)</a:t>
+            </a:r>
+          </a:p>
+        </p:txBody>
+      </p:sp>
+      <p:sp>
+        <p:nvSpPr>
+          <p:cNvPr id="3" name="Marcador de contenido 2">
+            <a:extLst>
+              <a:ext uri="{FF2B5EF4-FFF2-40B4-BE49-F238E27FC236}">
+                <a16:creationId xmlns:a16="http://schemas.microsoft.com/office/drawing/2014/main" id="{22D85BF1-9751-4857-A378-11B2BC55ACC1}"/>
+              </a:ext>
+            </a:extLst>
+          </p:cNvPr>
+          <p:cNvSpPr>
+            <a:spLocks noGrp="1"/>
+          </p:cNvSpPr>
+          <p:nvPr>
+            <p:ph idx="1"/>
+          </p:nvPr>
+        </p:nvSpPr>
+        <p:spPr/>
+        <p:txBody>
+          <a:bodyPr/>
+          <a:lstStyle/>
+          <a:p>
+            <a:r>
+              <a:rPr lang="es-ES" dirty="0"/>
+              <a:t>Se usa el método </a:t>
+            </a:r>
+            <a:r>
+              <a:rPr lang="es-ES" b="1" dirty="0" err="1"/>
+              <a:t>MessageBox</a:t>
+            </a:r>
+            <a:r>
+              <a:rPr lang="es-ES" dirty="0"/>
+              <a:t>. Se puede llamar a este método de dos formas:</a:t>
+            </a:r>
+          </a:p>
+          <a:p>
+            <a:pPr lvl="1"/>
+            <a:r>
+              <a:rPr lang="es-ES" b="1" dirty="0" err="1"/>
+              <a:t>Mbox</a:t>
+            </a:r>
+            <a:r>
+              <a:rPr lang="es-ES" dirty="0"/>
+              <a:t> y dos veces tabulador. Mostrará la estructura básica del método.</a:t>
+            </a:r>
+          </a:p>
+          <a:p>
+            <a:pPr lvl="1"/>
+            <a:r>
+              <a:rPr lang="es-ES" dirty="0"/>
+              <a:t>Escribir manualmente el método:</a:t>
+            </a:r>
+          </a:p>
+          <a:p>
+            <a:pPr marL="457200" lvl="1" indent="0">
+              <a:buNone/>
+            </a:pPr>
+            <a:r>
+              <a:rPr lang="es-ES" dirty="0"/>
+              <a:t>	</a:t>
+            </a:r>
+            <a:r>
+              <a:rPr lang="es-ES" sz="2000" i="1" dirty="0" err="1"/>
+              <a:t>MessageBox.Show</a:t>
+            </a:r>
+            <a:r>
+              <a:rPr lang="es-ES" sz="2000" i="1" dirty="0"/>
+              <a:t>(“&lt;mensaje&gt;”);</a:t>
+            </a:r>
+          </a:p>
+          <a:p>
+            <a:pPr lvl="1"/>
+            <a:endParaRPr lang="es-ES" b="1" dirty="0"/>
+          </a:p>
+        </p:txBody>
+      </p:sp>
+    </p:spTree>
+    <p:extLst>
+      <p:ext uri="{BB962C8B-B14F-4D97-AF65-F5344CB8AC3E}">
+        <p14:creationId xmlns:p14="http://schemas.microsoft.com/office/powerpoint/2010/main" val="617340827"/>
+      </p:ext>
+    </p:extLst>
+  </p:cSld>
+  <p:clrMapOvr>
+    <a:masterClrMapping/>
+  </p:clrMapOvr>
+</p:sld>
+</file>
+
+<file path=ppt/slides/slide13.xml><?xml version="1.0" encoding="utf-8"?>
+<p:sld xmlns:a="http://schemas.openxmlformats.org/drawingml/2006/main" xmlns:r="http://schemas.openxmlformats.org/officeDocument/2006/relationships" xmlns:p="http://schemas.openxmlformats.org/presentationml/2006/main">
+  <p:cSld>
+    <p:spTree>
+      <p:nvGrpSpPr>
+        <p:cNvPr id="1" name=""/>
+        <p:cNvGrpSpPr/>
+        <p:nvPr/>
+      </p:nvGrpSpPr>
+      <p:grpSpPr>
+        <a:xfrm>
+          <a:off x="0" y="0"/>
+          <a:ext cx="0" cy="0"/>
+          <a:chOff x="0" y="0"/>
+          <a:chExt cx="0" cy="0"/>
+        </a:xfrm>
+      </p:grpSpPr>
+      <p:sp>
+        <p:nvSpPr>
+          <p:cNvPr id="2" name="Título 1">
+            <a:extLst>
+              <a:ext uri="{FF2B5EF4-FFF2-40B4-BE49-F238E27FC236}">
+                <a16:creationId xmlns:a16="http://schemas.microsoft.com/office/drawing/2014/main" id="{21CDDC3B-46E2-4EE8-B202-DE3A9BE335CD}"/>
+              </a:ext>
+            </a:extLst>
+          </p:cNvPr>
+          <p:cNvSpPr>
+            <a:spLocks noGrp="1"/>
+          </p:cNvSpPr>
+          <p:nvPr>
+            <p:ph type="title"/>
+          </p:nvPr>
+        </p:nvSpPr>
+        <p:spPr/>
+        <p:txBody>
+          <a:bodyPr/>
+          <a:lstStyle/>
+          <a:p>
+            <a:r>
+              <a:rPr lang="es-ES" dirty="0"/>
+              <a:t>Aplicaciones y formularios (Vídeo 12)</a:t>
+            </a:r>
+          </a:p>
+        </p:txBody>
+      </p:sp>
+      <p:sp>
+        <p:nvSpPr>
+          <p:cNvPr id="3" name="Marcador de contenido 2">
+            <a:extLst>
+              <a:ext uri="{FF2B5EF4-FFF2-40B4-BE49-F238E27FC236}">
+                <a16:creationId xmlns:a16="http://schemas.microsoft.com/office/drawing/2014/main" id="{E7B7ADF2-45DD-43B5-9A07-60EDBD73CC9E}"/>
+              </a:ext>
+            </a:extLst>
+          </p:cNvPr>
+          <p:cNvSpPr>
+            <a:spLocks noGrp="1"/>
+          </p:cNvSpPr>
+          <p:nvPr>
+            <p:ph idx="1"/>
+          </p:nvPr>
+        </p:nvSpPr>
+        <p:spPr/>
+        <p:txBody>
+          <a:bodyPr/>
+          <a:lstStyle/>
+          <a:p>
+            <a:r>
+              <a:rPr lang="es-ES" dirty="0"/>
+              <a:t>Para cerrar y salir de una aplicación la instrucción que se usa es:</a:t>
+            </a:r>
+          </a:p>
+          <a:p>
+            <a:pPr marL="457200" lvl="1" indent="0">
+              <a:buNone/>
+            </a:pPr>
+            <a:r>
+              <a:rPr lang="es-ES" i="1" dirty="0" err="1"/>
+              <a:t>Application.Exit</a:t>
+            </a:r>
+            <a:r>
+              <a:rPr lang="es-ES" i="1" dirty="0"/>
+              <a:t>();</a:t>
+            </a:r>
+          </a:p>
+          <a:p>
+            <a:r>
+              <a:rPr lang="es-ES" dirty="0"/>
+              <a:t>Para cerrar un formulario la instrucción es:</a:t>
+            </a:r>
+          </a:p>
+          <a:p>
+            <a:pPr marL="457200" lvl="1" indent="0">
+              <a:buNone/>
+            </a:pPr>
+            <a:r>
+              <a:rPr lang="es-ES" i="1" dirty="0" err="1"/>
+              <a:t>Close</a:t>
+            </a:r>
+            <a:r>
+              <a:rPr lang="es-ES" i="1" dirty="0"/>
+              <a:t>();</a:t>
+            </a:r>
+            <a:r>
+              <a:rPr lang="es-ES" dirty="0"/>
+              <a:t> </a:t>
+            </a:r>
+            <a:r>
+              <a:rPr lang="es-ES" dirty="0" err="1"/>
+              <a:t>ó</a:t>
+            </a:r>
+            <a:r>
+              <a:rPr lang="es-ES" dirty="0"/>
+              <a:t> </a:t>
+            </a:r>
+            <a:r>
+              <a:rPr lang="es-ES" i="1" dirty="0" err="1"/>
+              <a:t>this.Close</a:t>
+            </a:r>
+            <a:r>
+              <a:rPr lang="es-ES" i="1" dirty="0"/>
+              <a:t>();</a:t>
+            </a:r>
+            <a:endParaRPr lang="es-ES" dirty="0"/>
+          </a:p>
+          <a:p>
+            <a:pPr marL="457200" lvl="1" indent="0">
+              <a:buNone/>
+            </a:pPr>
+            <a:endParaRPr lang="es-ES" dirty="0"/>
+          </a:p>
+        </p:txBody>
+      </p:sp>
+    </p:spTree>
+    <p:extLst>
+      <p:ext uri="{BB962C8B-B14F-4D97-AF65-F5344CB8AC3E}">
+        <p14:creationId xmlns:p14="http://schemas.microsoft.com/office/powerpoint/2010/main" val="3200738586"/>
+      </p:ext>
+    </p:extLst>
+  </p:cSld>
+  <p:clrMapOvr>
+    <a:masterClrMapping/>
+  </p:clrMapOvr>
+</p:sld>
+</file>
+
+<file path=ppt/slides/slide14.xml><?xml version="1.0" encoding="utf-8"?>
+<p:sld xmlns:a="http://schemas.openxmlformats.org/drawingml/2006/main" xmlns:r="http://schemas.openxmlformats.org/officeDocument/2006/relationships" xmlns:p="http://schemas.openxmlformats.org/presentationml/2006/main">
+  <p:cSld>
+    <p:spTree>
+      <p:nvGrpSpPr>
+        <p:cNvPr id="1" name=""/>
+        <p:cNvGrpSpPr/>
+        <p:nvPr/>
+      </p:nvGrpSpPr>
+      <p:grpSpPr>
+        <a:xfrm>
+          <a:off x="0" y="0"/>
+          <a:ext cx="0" cy="0"/>
+          <a:chOff x="0" y="0"/>
+          <a:chExt cx="0" cy="0"/>
+        </a:xfrm>
+      </p:grpSpPr>
+      <p:sp>
+        <p:nvSpPr>
+          <p:cNvPr id="2" name="Título 1">
+            <a:extLst>
+              <a:ext uri="{FF2B5EF4-FFF2-40B4-BE49-F238E27FC236}">
+                <a16:creationId xmlns:a16="http://schemas.microsoft.com/office/drawing/2014/main" id="{14B4A721-3CE2-4CEA-BDB7-478BFEF9605F}"/>
+              </a:ext>
+            </a:extLst>
+          </p:cNvPr>
+          <p:cNvSpPr>
+            <a:spLocks noGrp="1"/>
+          </p:cNvSpPr>
+          <p:nvPr>
+            <p:ph type="title"/>
+          </p:nvPr>
+        </p:nvSpPr>
+        <p:spPr/>
+        <p:txBody>
+          <a:bodyPr/>
+          <a:lstStyle/>
+          <a:p>
+            <a:r>
+              <a:rPr lang="es-ES" dirty="0"/>
+              <a:t>Control de errores I (Vídeo 13)</a:t>
+            </a:r>
+          </a:p>
+        </p:txBody>
+      </p:sp>
+      <p:sp>
+        <p:nvSpPr>
+          <p:cNvPr id="3" name="Marcador de contenido 2">
+            <a:extLst>
+              <a:ext uri="{FF2B5EF4-FFF2-40B4-BE49-F238E27FC236}">
+                <a16:creationId xmlns:a16="http://schemas.microsoft.com/office/drawing/2014/main" id="{E2A70EA3-E455-428C-98C5-E16514A3612D}"/>
+              </a:ext>
+            </a:extLst>
+          </p:cNvPr>
+          <p:cNvSpPr>
+            <a:spLocks noGrp="1"/>
+          </p:cNvSpPr>
+          <p:nvPr>
+            <p:ph idx="1"/>
+          </p:nvPr>
+        </p:nvSpPr>
+        <p:spPr/>
+        <p:txBody>
+          <a:bodyPr/>
+          <a:lstStyle/>
+          <a:p>
+            <a:r>
+              <a:rPr lang="es-ES" dirty="0"/>
+              <a:t>Para controlar errores se usa la estructura </a:t>
+            </a:r>
+            <a:r>
+              <a:rPr lang="es-ES" b="1" dirty="0"/>
+              <a:t>try…catch</a:t>
+            </a:r>
+            <a:r>
+              <a:rPr lang="es-ES" dirty="0"/>
+              <a:t>. Su sintaxis es:</a:t>
+            </a:r>
+          </a:p>
+          <a:p>
+            <a:pPr marL="457200" lvl="1" indent="0">
+              <a:buNone/>
+            </a:pPr>
+            <a:r>
+              <a:rPr lang="es-ES" i="1" dirty="0"/>
+              <a:t>try{</a:t>
+            </a:r>
+          </a:p>
+          <a:p>
+            <a:pPr marL="457200" lvl="1" indent="0">
+              <a:buNone/>
+            </a:pPr>
+            <a:r>
+              <a:rPr lang="es-ES" i="1" dirty="0"/>
+              <a:t>	//instrucciones susceptibles de provocar errores</a:t>
+            </a:r>
+          </a:p>
+          <a:p>
+            <a:pPr marL="457200" lvl="1" indent="0">
+              <a:buNone/>
+            </a:pPr>
+            <a:r>
+              <a:rPr lang="es-ES" i="1" dirty="0"/>
+              <a:t>} catch (</a:t>
+            </a:r>
+            <a:r>
+              <a:rPr lang="es-ES" i="1" dirty="0" err="1"/>
+              <a:t>Exception</a:t>
+            </a:r>
+            <a:r>
+              <a:rPr lang="es-ES" i="1" dirty="0"/>
+              <a:t> &lt;nombre de una nueva variable&gt;){</a:t>
+            </a:r>
+          </a:p>
+          <a:p>
+            <a:pPr marL="457200" lvl="1" indent="0">
+              <a:buNone/>
+            </a:pPr>
+            <a:r>
+              <a:rPr lang="es-ES" i="1" dirty="0"/>
+              <a:t>	//instrucciones que se ejecutan si se produce un error</a:t>
+            </a:r>
+          </a:p>
+          <a:p>
+            <a:pPr marL="457200" lvl="1" indent="0">
+              <a:buNone/>
+            </a:pPr>
+            <a:r>
+              <a:rPr lang="es-ES" i="1" dirty="0"/>
+              <a:t>}</a:t>
+            </a:r>
+          </a:p>
+          <a:p>
+            <a:r>
+              <a:rPr lang="es-ES" dirty="0"/>
+              <a:t>El </a:t>
+            </a:r>
+            <a:r>
+              <a:rPr lang="es-ES" b="1" dirty="0" err="1"/>
+              <a:t>Exception</a:t>
+            </a:r>
+            <a:r>
+              <a:rPr lang="es-ES" dirty="0"/>
+              <a:t> se puede sustituir por un error en concreto de la siguiente forma tomada como ejemplo:</a:t>
+            </a:r>
+          </a:p>
+        </p:txBody>
+      </p:sp>
+      <p:sp>
+        <p:nvSpPr>
+          <p:cNvPr id="4" name="Flecha: a la derecha 3">
+            <a:extLst>
+              <a:ext uri="{FF2B5EF4-FFF2-40B4-BE49-F238E27FC236}">
+                <a16:creationId xmlns:a16="http://schemas.microsoft.com/office/drawing/2014/main" id="{7C67FF2C-9834-43B8-9EF6-B3D379E64B80}"/>
+              </a:ext>
+            </a:extLst>
+          </p:cNvPr>
+          <p:cNvSpPr/>
+          <p:nvPr/>
+        </p:nvSpPr>
+        <p:spPr>
+          <a:xfrm>
+            <a:off x="10375392" y="5692331"/>
+            <a:ext cx="978408" cy="484632"/>
+          </a:xfrm>
+          <a:prstGeom prst="rightArrow">
+            <a:avLst/>
+          </a:prstGeom>
+        </p:spPr>
+        <p:style>
+          <a:lnRef idx="2">
+            <a:schemeClr val="accent1">
+              <a:shade val="50000"/>
+            </a:schemeClr>
+          </a:lnRef>
+          <a:fillRef idx="1">
+            <a:schemeClr val="accent1"/>
+          </a:fillRef>
+          <a:effectRef idx="0">
+            <a:schemeClr val="accent1"/>
+          </a:effectRef>
+          <a:fontRef idx="minor">
+            <a:schemeClr val="lt1"/>
+          </a:fontRef>
+        </p:style>
+        <p:txBody>
+          <a:bodyPr rtlCol="0" anchor="ctr"/>
+          <a:lstStyle/>
+          <a:p>
+            <a:pPr algn="ctr"/>
+            <a:endParaRPr lang="es-ES"/>
+          </a:p>
+        </p:txBody>
+      </p:sp>
+    </p:spTree>
+    <p:extLst>
+      <p:ext uri="{BB962C8B-B14F-4D97-AF65-F5344CB8AC3E}">
+        <p14:creationId xmlns:p14="http://schemas.microsoft.com/office/powerpoint/2010/main" val="3783259407"/>
+      </p:ext>
+    </p:extLst>
+  </p:cSld>
+  <p:clrMapOvr>
+    <a:masterClrMapping/>
+  </p:clrMapOvr>
+</p:sld>
+</file>
+
+<file path=ppt/slides/slide15.xml><?xml version="1.0" encoding="utf-8"?>
+<p:sld xmlns:a="http://schemas.openxmlformats.org/drawingml/2006/main" xmlns:r="http://schemas.openxmlformats.org/officeDocument/2006/relationships" xmlns:p="http://schemas.openxmlformats.org/presentationml/2006/main">
+  <p:cSld>
+    <p:spTree>
+      <p:nvGrpSpPr>
+        <p:cNvPr id="1" name=""/>
+        <p:cNvGrpSpPr/>
+        <p:nvPr/>
+      </p:nvGrpSpPr>
+      <p:grpSpPr>
+        <a:xfrm>
+          <a:off x="0" y="0"/>
+          <a:ext cx="0" cy="0"/>
+          <a:chOff x="0" y="0"/>
+          <a:chExt cx="0" cy="0"/>
+        </a:xfrm>
+      </p:grpSpPr>
+      <p:sp>
+        <p:nvSpPr>
+          <p:cNvPr id="2" name="Título 1">
+            <a:extLst>
+              <a:ext uri="{FF2B5EF4-FFF2-40B4-BE49-F238E27FC236}">
+                <a16:creationId xmlns:a16="http://schemas.microsoft.com/office/drawing/2014/main" id="{39E4AF31-54B0-4CED-84E2-4F3DCB5EC1B8}"/>
+              </a:ext>
+            </a:extLst>
+          </p:cNvPr>
+          <p:cNvSpPr>
+            <a:spLocks noGrp="1"/>
+          </p:cNvSpPr>
+          <p:nvPr>
+            <p:ph type="title"/>
+          </p:nvPr>
+        </p:nvSpPr>
+        <p:spPr/>
+        <p:txBody>
+          <a:bodyPr/>
+          <a:lstStyle/>
+          <a:p>
+            <a:r>
+              <a:rPr lang="es-ES" dirty="0"/>
+              <a:t>Control de errores II (Vídeo 13)</a:t>
+            </a:r>
+          </a:p>
+        </p:txBody>
+      </p:sp>
+      <p:sp>
+        <p:nvSpPr>
+          <p:cNvPr id="3" name="Marcador de contenido 2">
+            <a:extLst>
+              <a:ext uri="{FF2B5EF4-FFF2-40B4-BE49-F238E27FC236}">
+                <a16:creationId xmlns:a16="http://schemas.microsoft.com/office/drawing/2014/main" id="{F4C40C5F-8767-4FC1-BAA6-CDC090FA79AE}"/>
+              </a:ext>
+            </a:extLst>
+          </p:cNvPr>
+          <p:cNvSpPr>
+            <a:spLocks noGrp="1"/>
+          </p:cNvSpPr>
+          <p:nvPr>
+            <p:ph idx="1"/>
+          </p:nvPr>
+        </p:nvSpPr>
+        <p:spPr/>
+        <p:txBody>
+          <a:bodyPr/>
+          <a:lstStyle/>
+          <a:p>
+            <a:pPr marL="457200" lvl="1" indent="0">
+              <a:buNone/>
+            </a:pPr>
+            <a:r>
+              <a:rPr lang="es-ES" dirty="0"/>
+              <a:t>	</a:t>
+            </a:r>
+            <a:r>
+              <a:rPr lang="es-ES" i="1" dirty="0"/>
+              <a:t>try{</a:t>
+            </a:r>
+          </a:p>
+          <a:p>
+            <a:pPr marL="457200" lvl="1" indent="0">
+              <a:buNone/>
+            </a:pPr>
+            <a:r>
+              <a:rPr lang="es-ES" i="1" dirty="0"/>
+              <a:t>		//instrucciones susceptibles de provocar errores</a:t>
+            </a:r>
+          </a:p>
+          <a:p>
+            <a:pPr marL="457200" lvl="1" indent="0">
+              <a:buNone/>
+            </a:pPr>
+            <a:r>
+              <a:rPr lang="es-ES" i="1" dirty="0"/>
+              <a:t>	} catch (</a:t>
+            </a:r>
+            <a:r>
+              <a:rPr lang="es-ES" i="1" dirty="0" err="1"/>
+              <a:t>OverFlowException</a:t>
+            </a:r>
+            <a:r>
+              <a:rPr lang="es-ES" i="1" dirty="0"/>
+              <a:t> &lt;nombre de una nueva variable&gt;){</a:t>
+            </a:r>
+          </a:p>
+          <a:p>
+            <a:pPr marL="457200" lvl="1" indent="0">
+              <a:buNone/>
+            </a:pPr>
+            <a:r>
+              <a:rPr lang="es-ES" i="1" dirty="0"/>
+              <a:t>		//instrucciones que se ejecutan si se produce un error de este tipo</a:t>
+            </a:r>
+          </a:p>
+          <a:p>
+            <a:pPr marL="457200" lvl="1" indent="0">
+              <a:buNone/>
+            </a:pPr>
+            <a:r>
+              <a:rPr lang="es-ES" i="1" dirty="0"/>
+              <a:t>	}</a:t>
+            </a:r>
+          </a:p>
+          <a:p>
+            <a:r>
+              <a:rPr lang="es-ES" dirty="0"/>
+              <a:t>Si se quieren añadir más capturas de otro tipo de errores, sólo hay que añadir otro </a:t>
+            </a:r>
+            <a:r>
+              <a:rPr lang="es-ES" b="1" dirty="0"/>
+              <a:t>catch:</a:t>
+            </a:r>
+            <a:endParaRPr lang="es-ES" dirty="0"/>
+          </a:p>
+        </p:txBody>
+      </p:sp>
+      <p:sp>
+        <p:nvSpPr>
+          <p:cNvPr id="4" name="Flecha: a la derecha 3">
+            <a:extLst>
+              <a:ext uri="{FF2B5EF4-FFF2-40B4-BE49-F238E27FC236}">
+                <a16:creationId xmlns:a16="http://schemas.microsoft.com/office/drawing/2014/main" id="{08B21F0C-DB60-430B-8B2F-97B9966D883A}"/>
+              </a:ext>
+            </a:extLst>
+          </p:cNvPr>
+          <p:cNvSpPr/>
+          <p:nvPr/>
+        </p:nvSpPr>
+        <p:spPr>
+          <a:xfrm>
+            <a:off x="10375392" y="5692331"/>
+            <a:ext cx="978408" cy="484632"/>
+          </a:xfrm>
+          <a:prstGeom prst="rightArrow">
+            <a:avLst/>
+          </a:prstGeom>
+        </p:spPr>
+        <p:style>
+          <a:lnRef idx="2">
+            <a:schemeClr val="accent1">
+              <a:shade val="50000"/>
+            </a:schemeClr>
+          </a:lnRef>
+          <a:fillRef idx="1">
+            <a:schemeClr val="accent1"/>
+          </a:fillRef>
+          <a:effectRef idx="0">
+            <a:schemeClr val="accent1"/>
+          </a:effectRef>
+          <a:fontRef idx="minor">
+            <a:schemeClr val="lt1"/>
+          </a:fontRef>
+        </p:style>
+        <p:txBody>
+          <a:bodyPr rtlCol="0" anchor="ctr"/>
+          <a:lstStyle/>
+          <a:p>
+            <a:pPr algn="ctr"/>
+            <a:endParaRPr lang="es-ES"/>
+          </a:p>
+        </p:txBody>
+      </p:sp>
+    </p:spTree>
+    <p:extLst>
+      <p:ext uri="{BB962C8B-B14F-4D97-AF65-F5344CB8AC3E}">
+        <p14:creationId xmlns:p14="http://schemas.microsoft.com/office/powerpoint/2010/main" val="1074729763"/>
+      </p:ext>
+    </p:extLst>
+  </p:cSld>
+  <p:clrMapOvr>
+    <a:masterClrMapping/>
+  </p:clrMapOvr>
+</p:sld>
+</file>
+
+<file path=ppt/slides/slide16.xml><?xml version="1.0" encoding="utf-8"?>
+<p:sld xmlns:a="http://schemas.openxmlformats.org/drawingml/2006/main" xmlns:r="http://schemas.openxmlformats.org/officeDocument/2006/relationships" xmlns:p="http://schemas.openxmlformats.org/presentationml/2006/main">
+  <p:cSld>
+    <p:spTree>
+      <p:nvGrpSpPr>
+        <p:cNvPr id="1" name=""/>
+        <p:cNvGrpSpPr/>
+        <p:nvPr/>
+      </p:nvGrpSpPr>
+      <p:grpSpPr>
+        <a:xfrm>
+          <a:off x="0" y="0"/>
+          <a:ext cx="0" cy="0"/>
+          <a:chOff x="0" y="0"/>
+          <a:chExt cx="0" cy="0"/>
+        </a:xfrm>
+      </p:grpSpPr>
+      <p:sp>
+        <p:nvSpPr>
+          <p:cNvPr id="2" name="Título 1">
+            <a:extLst>
+              <a:ext uri="{FF2B5EF4-FFF2-40B4-BE49-F238E27FC236}">
+                <a16:creationId xmlns:a16="http://schemas.microsoft.com/office/drawing/2014/main" id="{73FFA031-4C5D-4BE2-B127-FE36226D1C2B}"/>
+              </a:ext>
+            </a:extLst>
+          </p:cNvPr>
+          <p:cNvSpPr>
+            <a:spLocks noGrp="1"/>
+          </p:cNvSpPr>
+          <p:nvPr>
+            <p:ph type="title"/>
+          </p:nvPr>
+        </p:nvSpPr>
+        <p:spPr/>
+        <p:txBody>
+          <a:bodyPr/>
+          <a:lstStyle/>
+          <a:p>
+            <a:r>
+              <a:rPr lang="es-ES" dirty="0"/>
+              <a:t>Control de errores III (Vídeo 13)</a:t>
+            </a:r>
+          </a:p>
+        </p:txBody>
+      </p:sp>
+      <p:sp>
+        <p:nvSpPr>
+          <p:cNvPr id="3" name="Marcador de contenido 2">
+            <a:extLst>
+              <a:ext uri="{FF2B5EF4-FFF2-40B4-BE49-F238E27FC236}">
+                <a16:creationId xmlns:a16="http://schemas.microsoft.com/office/drawing/2014/main" id="{832C1B71-AECC-4BBC-8753-3A2D2F9D9E6A}"/>
+              </a:ext>
+            </a:extLst>
+          </p:cNvPr>
+          <p:cNvSpPr>
+            <a:spLocks noGrp="1"/>
+          </p:cNvSpPr>
+          <p:nvPr>
+            <p:ph idx="1"/>
+          </p:nvPr>
+        </p:nvSpPr>
+        <p:spPr/>
+        <p:txBody>
+          <a:bodyPr/>
+          <a:lstStyle/>
+          <a:p>
+            <a:pPr marL="457200" lvl="1" indent="0">
+              <a:buNone/>
+            </a:pPr>
+            <a:r>
+              <a:rPr lang="es-ES" dirty="0"/>
+              <a:t>	</a:t>
+            </a:r>
+            <a:r>
+              <a:rPr lang="es-ES" i="1" dirty="0"/>
+              <a:t>try{</a:t>
+            </a:r>
+          </a:p>
+          <a:p>
+            <a:pPr marL="457200" lvl="1" indent="0">
+              <a:buNone/>
+            </a:pPr>
+            <a:r>
+              <a:rPr lang="es-ES" i="1" dirty="0"/>
+              <a:t>		//instrucciones susceptibles de provocar errores</a:t>
+            </a:r>
+          </a:p>
+          <a:p>
+            <a:pPr marL="457200" lvl="1" indent="0">
+              <a:buNone/>
+            </a:pPr>
+            <a:r>
+              <a:rPr lang="es-ES" i="1" dirty="0"/>
+              <a:t>	} catch (</a:t>
+            </a:r>
+            <a:r>
+              <a:rPr lang="es-ES" i="1" dirty="0" err="1"/>
+              <a:t>OverFlowException</a:t>
+            </a:r>
+            <a:r>
+              <a:rPr lang="es-ES" i="1" dirty="0"/>
+              <a:t> &lt;nombre de una nueva variable&gt;){</a:t>
+            </a:r>
+          </a:p>
+          <a:p>
+            <a:pPr marL="457200" lvl="1" indent="0">
+              <a:buNone/>
+            </a:pPr>
+            <a:r>
+              <a:rPr lang="es-ES" i="1" dirty="0"/>
+              <a:t>		//instrucciones que se ejecutan si se produce un error de este tipo</a:t>
+            </a:r>
+          </a:p>
+          <a:p>
+            <a:pPr marL="457200" lvl="1" indent="0">
+              <a:buNone/>
+            </a:pPr>
+            <a:r>
+              <a:rPr lang="es-ES" i="1" dirty="0"/>
+              <a:t>	} catch (</a:t>
+            </a:r>
+            <a:r>
+              <a:rPr lang="es-ES" i="1" dirty="0" err="1"/>
+              <a:t>FormatException</a:t>
+            </a:r>
+            <a:r>
+              <a:rPr lang="es-ES" i="1" dirty="0"/>
+              <a:t> &lt;nombre de una nueva variable&gt;){</a:t>
+            </a:r>
+          </a:p>
+          <a:p>
+            <a:pPr marL="457200" lvl="1" indent="0">
+              <a:buNone/>
+            </a:pPr>
+            <a:r>
+              <a:rPr lang="es-ES" i="1" dirty="0"/>
+              <a:t>		//instrucciones que se ejecutan si se produce un error de este tipo</a:t>
+            </a:r>
+          </a:p>
+          <a:p>
+            <a:pPr marL="457200" lvl="1" indent="0">
+              <a:buNone/>
+            </a:pPr>
+            <a:r>
+              <a:rPr lang="es-ES" i="1" dirty="0"/>
+              <a:t>	}</a:t>
+            </a:r>
+          </a:p>
+          <a:p>
+            <a:endParaRPr lang="es-ES" dirty="0"/>
+          </a:p>
+        </p:txBody>
+      </p:sp>
+    </p:spTree>
+    <p:extLst>
+      <p:ext uri="{BB962C8B-B14F-4D97-AF65-F5344CB8AC3E}">
+        <p14:creationId xmlns:p14="http://schemas.microsoft.com/office/powerpoint/2010/main" val="669097250"/>
+      </p:ext>
+    </p:extLst>
+  </p:cSld>
+  <p:clrMapOvr>
+    <a:masterClrMapping/>
+  </p:clrMapOvr>
+</p:sld>
+</file>
+
+<file path=ppt/slides/slide17.xml><?xml version="1.0" encoding="utf-8"?>
+<p:sld xmlns:a="http://schemas.openxmlformats.org/drawingml/2006/main" xmlns:r="http://schemas.openxmlformats.org/officeDocument/2006/relationships" xmlns:p="http://schemas.openxmlformats.org/presentationml/2006/main">
+  <p:cSld>
+    <p:spTree>
+      <p:nvGrpSpPr>
+        <p:cNvPr id="1" name=""/>
+        <p:cNvGrpSpPr/>
+        <p:nvPr/>
+      </p:nvGrpSpPr>
+      <p:grpSpPr>
+        <a:xfrm>
+          <a:off x="0" y="0"/>
+          <a:ext cx="0" cy="0"/>
+          <a:chOff x="0" y="0"/>
+          <a:chExt cx="0" cy="0"/>
+        </a:xfrm>
+      </p:grpSpPr>
+      <p:sp>
+        <p:nvSpPr>
+          <p:cNvPr id="2" name="Título 1">
+            <a:extLst>
+              <a:ext uri="{FF2B5EF4-FFF2-40B4-BE49-F238E27FC236}">
+                <a16:creationId xmlns:a16="http://schemas.microsoft.com/office/drawing/2014/main" id="{C3B2CE50-DAA4-481A-8533-3D72E83CED13}"/>
+              </a:ext>
+            </a:extLst>
+          </p:cNvPr>
+          <p:cNvSpPr>
+            <a:spLocks noGrp="1"/>
+          </p:cNvSpPr>
+          <p:nvPr>
+            <p:ph type="title"/>
+          </p:nvPr>
+        </p:nvSpPr>
+        <p:spPr/>
+        <p:txBody>
+          <a:bodyPr/>
+          <a:lstStyle/>
+          <a:p>
+            <a:r>
+              <a:rPr lang="es-ES" dirty="0"/>
+              <a:t>Sentencia </a:t>
+            </a:r>
+            <a:r>
+              <a:rPr lang="es-ES" b="1" dirty="0" err="1"/>
+              <a:t>if</a:t>
+            </a:r>
+            <a:r>
+              <a:rPr lang="es-ES" dirty="0"/>
+              <a:t> I (Vídeos 15, 16, 17 y 18)</a:t>
+            </a:r>
+          </a:p>
+        </p:txBody>
+      </p:sp>
+      <p:sp>
+        <p:nvSpPr>
+          <p:cNvPr id="3" name="Marcador de contenido 2">
+            <a:extLst>
+              <a:ext uri="{FF2B5EF4-FFF2-40B4-BE49-F238E27FC236}">
+                <a16:creationId xmlns:a16="http://schemas.microsoft.com/office/drawing/2014/main" id="{7D7F5034-2509-40F2-B0F3-8D2D1B95FDC4}"/>
+              </a:ext>
+            </a:extLst>
+          </p:cNvPr>
+          <p:cNvSpPr>
+            <a:spLocks noGrp="1"/>
+          </p:cNvSpPr>
+          <p:nvPr>
+            <p:ph idx="1"/>
+          </p:nvPr>
+        </p:nvSpPr>
+        <p:spPr/>
+        <p:txBody>
+          <a:bodyPr/>
+          <a:lstStyle/>
+          <a:p>
+            <a:r>
+              <a:rPr lang="es-ES" dirty="0"/>
+              <a:t>Su sintaxis es:</a:t>
+            </a:r>
+          </a:p>
+          <a:p>
+            <a:pPr marL="457200" lvl="1" indent="0">
+              <a:buNone/>
+            </a:pPr>
+            <a:r>
+              <a:rPr lang="es-ES" i="1" dirty="0" err="1"/>
+              <a:t>if</a:t>
+            </a:r>
+            <a:r>
+              <a:rPr lang="es-ES" i="1" dirty="0"/>
+              <a:t> (&lt;condición&gt;){</a:t>
+            </a:r>
+          </a:p>
+          <a:p>
+            <a:pPr marL="457200" lvl="1" indent="0">
+              <a:buNone/>
+            </a:pPr>
+            <a:r>
+              <a:rPr lang="es-ES" i="1" dirty="0"/>
+              <a:t>	//instrucciones</a:t>
+            </a:r>
+          </a:p>
+          <a:p>
+            <a:pPr marL="457200" lvl="1" indent="0">
+              <a:buNone/>
+            </a:pPr>
+            <a:r>
+              <a:rPr lang="es-ES" i="1" dirty="0"/>
+              <a:t>}</a:t>
+            </a:r>
+          </a:p>
+          <a:p>
+            <a:r>
+              <a:rPr lang="es-ES" dirty="0"/>
+              <a:t>Otra sintaxis un poco más complicada es:</a:t>
+            </a:r>
+          </a:p>
+          <a:p>
+            <a:pPr marL="457200" lvl="1" indent="0">
+              <a:buNone/>
+            </a:pPr>
+            <a:r>
+              <a:rPr lang="es-ES" i="1" dirty="0" err="1"/>
+              <a:t>if</a:t>
+            </a:r>
+            <a:r>
+              <a:rPr lang="es-ES" i="1" dirty="0"/>
+              <a:t> (&lt;condición&gt;){</a:t>
+            </a:r>
+          </a:p>
+          <a:p>
+            <a:pPr marL="457200" lvl="1" indent="0">
+              <a:buNone/>
+            </a:pPr>
+            <a:r>
+              <a:rPr lang="es-ES" i="1" dirty="0"/>
+              <a:t>	//instrucciones</a:t>
+            </a:r>
+          </a:p>
+          <a:p>
+            <a:pPr marL="457200" lvl="1" indent="0">
+              <a:buNone/>
+            </a:pPr>
+            <a:r>
+              <a:rPr lang="es-ES" i="1" dirty="0"/>
+              <a:t>} </a:t>
+            </a:r>
+            <a:r>
+              <a:rPr lang="es-ES" i="1" dirty="0" err="1"/>
+              <a:t>else</a:t>
+            </a:r>
+            <a:r>
+              <a:rPr lang="es-ES" i="1" dirty="0"/>
+              <a:t> {</a:t>
+            </a:r>
+          </a:p>
+          <a:p>
+            <a:pPr marL="457200" lvl="1" indent="0">
+              <a:buNone/>
+            </a:pPr>
+            <a:r>
+              <a:rPr lang="es-ES" i="1" dirty="0"/>
+              <a:t>	//instrucciones</a:t>
+            </a:r>
+          </a:p>
+          <a:p>
+            <a:pPr marL="457200" lvl="1" indent="0">
+              <a:buNone/>
+            </a:pPr>
+            <a:r>
+              <a:rPr lang="es-ES" i="1" dirty="0"/>
+              <a:t>}</a:t>
+            </a:r>
+          </a:p>
+          <a:p>
+            <a:pPr marL="457200" lvl="1" indent="0">
+              <a:buNone/>
+            </a:pPr>
+            <a:endParaRPr lang="es-ES" i="1" dirty="0"/>
+          </a:p>
+        </p:txBody>
+      </p:sp>
+      <p:sp>
+        <p:nvSpPr>
+          <p:cNvPr id="4" name="Flecha: a la derecha 3">
+            <a:extLst>
+              <a:ext uri="{FF2B5EF4-FFF2-40B4-BE49-F238E27FC236}">
+                <a16:creationId xmlns:a16="http://schemas.microsoft.com/office/drawing/2014/main" id="{0DD7C8DC-3498-4A14-9BD5-3108118C89E7}"/>
+              </a:ext>
+            </a:extLst>
+          </p:cNvPr>
+          <p:cNvSpPr/>
+          <p:nvPr/>
+        </p:nvSpPr>
+        <p:spPr>
+          <a:xfrm>
+            <a:off x="10375392" y="5692331"/>
+            <a:ext cx="978408" cy="484632"/>
+          </a:xfrm>
+          <a:prstGeom prst="rightArrow">
+            <a:avLst/>
+          </a:prstGeom>
+        </p:spPr>
+        <p:style>
+          <a:lnRef idx="2">
+            <a:schemeClr val="accent1">
+              <a:shade val="50000"/>
+            </a:schemeClr>
+          </a:lnRef>
+          <a:fillRef idx="1">
+            <a:schemeClr val="accent1"/>
+          </a:fillRef>
+          <a:effectRef idx="0">
+            <a:schemeClr val="accent1"/>
+          </a:effectRef>
+          <a:fontRef idx="minor">
+            <a:schemeClr val="lt1"/>
+          </a:fontRef>
+        </p:style>
+        <p:txBody>
+          <a:bodyPr rtlCol="0" anchor="ctr"/>
+          <a:lstStyle/>
+          <a:p>
+            <a:pPr algn="ctr"/>
+            <a:endParaRPr lang="es-ES"/>
+          </a:p>
+        </p:txBody>
+      </p:sp>
+    </p:spTree>
+    <p:extLst>
+      <p:ext uri="{BB962C8B-B14F-4D97-AF65-F5344CB8AC3E}">
+        <p14:creationId xmlns:p14="http://schemas.microsoft.com/office/powerpoint/2010/main" val="612931721"/>
+      </p:ext>
+    </p:extLst>
+  </p:cSld>
+  <p:clrMapOvr>
+    <a:masterClrMapping/>
+  </p:clrMapOvr>
+</p:sld>
+</file>
+
+<file path=ppt/slides/slide18.xml><?xml version="1.0" encoding="utf-8"?>
+<p:sld xmlns:a="http://schemas.openxmlformats.org/drawingml/2006/main" xmlns:r="http://schemas.openxmlformats.org/officeDocument/2006/relationships" xmlns:p="http://schemas.openxmlformats.org/presentationml/2006/main">
+  <p:cSld>
+    <p:spTree>
+      <p:nvGrpSpPr>
+        <p:cNvPr id="1" name=""/>
+        <p:cNvGrpSpPr/>
+        <p:nvPr/>
+      </p:nvGrpSpPr>
+      <p:grpSpPr>
+        <a:xfrm>
+          <a:off x="0" y="0"/>
+          <a:ext cx="0" cy="0"/>
+          <a:chOff x="0" y="0"/>
+          <a:chExt cx="0" cy="0"/>
+        </a:xfrm>
+      </p:grpSpPr>
+      <p:sp>
+        <p:nvSpPr>
+          <p:cNvPr id="2" name="Título 1">
+            <a:extLst>
+              <a:ext uri="{FF2B5EF4-FFF2-40B4-BE49-F238E27FC236}">
+                <a16:creationId xmlns:a16="http://schemas.microsoft.com/office/drawing/2014/main" id="{A97221FE-48DA-4ED6-8A00-1D0C225DF49F}"/>
+              </a:ext>
+            </a:extLst>
+          </p:cNvPr>
+          <p:cNvSpPr>
+            <a:spLocks noGrp="1"/>
+          </p:cNvSpPr>
+          <p:nvPr>
+            <p:ph type="title"/>
+          </p:nvPr>
+        </p:nvSpPr>
+        <p:spPr/>
+        <p:txBody>
+          <a:bodyPr/>
+          <a:lstStyle/>
+          <a:p>
+            <a:r>
+              <a:rPr lang="es-ES" dirty="0"/>
+              <a:t>Sentencia </a:t>
+            </a:r>
+            <a:r>
+              <a:rPr lang="es-ES" b="1" dirty="0" err="1"/>
+              <a:t>if</a:t>
+            </a:r>
+            <a:r>
+              <a:rPr lang="es-ES" dirty="0"/>
+              <a:t> II(Vídeos 15, 16, 17 y 18)</a:t>
+            </a:r>
+          </a:p>
+        </p:txBody>
+      </p:sp>
+      <p:sp>
+        <p:nvSpPr>
+          <p:cNvPr id="3" name="Marcador de contenido 2">
+            <a:extLst>
+              <a:ext uri="{FF2B5EF4-FFF2-40B4-BE49-F238E27FC236}">
+                <a16:creationId xmlns:a16="http://schemas.microsoft.com/office/drawing/2014/main" id="{2A16D648-1F3D-40B4-97D5-F0328E6EFFC7}"/>
+              </a:ext>
+            </a:extLst>
+          </p:cNvPr>
+          <p:cNvSpPr>
+            <a:spLocks noGrp="1"/>
+          </p:cNvSpPr>
+          <p:nvPr>
+            <p:ph idx="1"/>
+          </p:nvPr>
+        </p:nvSpPr>
+        <p:spPr/>
+        <p:txBody>
+          <a:bodyPr/>
+          <a:lstStyle/>
+          <a:p>
+            <a:r>
+              <a:rPr lang="es-ES" dirty="0"/>
+              <a:t>Operadores de comparación:</a:t>
+            </a:r>
+          </a:p>
+          <a:p>
+            <a:pPr lvl="1"/>
+            <a:r>
+              <a:rPr lang="es-ES" b="1" dirty="0"/>
+              <a:t>==</a:t>
+            </a:r>
+            <a:r>
+              <a:rPr lang="es-ES" dirty="0"/>
+              <a:t>: Igual a</a:t>
+            </a:r>
+          </a:p>
+          <a:p>
+            <a:pPr lvl="1"/>
+            <a:r>
+              <a:rPr lang="es-ES" b="1" dirty="0"/>
+              <a:t>!=</a:t>
+            </a:r>
+            <a:r>
+              <a:rPr lang="es-ES" dirty="0"/>
+              <a:t>: Distinto de</a:t>
+            </a:r>
+          </a:p>
+          <a:p>
+            <a:pPr lvl="1"/>
+            <a:r>
+              <a:rPr lang="es-ES" b="1" dirty="0"/>
+              <a:t>&lt;</a:t>
+            </a:r>
+            <a:r>
+              <a:rPr lang="es-ES" dirty="0"/>
+              <a:t>: Menor que</a:t>
+            </a:r>
+          </a:p>
+          <a:p>
+            <a:pPr lvl="1"/>
+            <a:r>
+              <a:rPr lang="es-ES" b="1" dirty="0"/>
+              <a:t>&gt;</a:t>
+            </a:r>
+            <a:r>
+              <a:rPr lang="es-ES" dirty="0"/>
+              <a:t>: Mayor que</a:t>
+            </a:r>
+          </a:p>
+          <a:p>
+            <a:pPr lvl="1"/>
+            <a:r>
+              <a:rPr lang="es-ES" b="1" dirty="0"/>
+              <a:t>&lt;=</a:t>
+            </a:r>
+            <a:r>
+              <a:rPr lang="es-ES" dirty="0"/>
+              <a:t>: Menor o igual que</a:t>
+            </a:r>
+          </a:p>
+          <a:p>
+            <a:pPr lvl="1"/>
+            <a:r>
+              <a:rPr lang="es-ES" b="1" dirty="0"/>
+              <a:t>&gt;=</a:t>
+            </a:r>
+            <a:r>
+              <a:rPr lang="es-ES" dirty="0"/>
+              <a:t>: Mayor o igual que</a:t>
+            </a:r>
+          </a:p>
+          <a:p>
+            <a:endParaRPr lang="es-ES" dirty="0"/>
+          </a:p>
+        </p:txBody>
+      </p:sp>
+      <p:sp>
+        <p:nvSpPr>
+          <p:cNvPr id="4" name="Flecha: a la derecha 3">
+            <a:extLst>
+              <a:ext uri="{FF2B5EF4-FFF2-40B4-BE49-F238E27FC236}">
+                <a16:creationId xmlns:a16="http://schemas.microsoft.com/office/drawing/2014/main" id="{5AA6C914-7149-488B-B529-0B1157BB5957}"/>
+              </a:ext>
+            </a:extLst>
+          </p:cNvPr>
+          <p:cNvSpPr/>
+          <p:nvPr/>
+        </p:nvSpPr>
+        <p:spPr>
+          <a:xfrm>
+            <a:off x="10375392" y="5692331"/>
+            <a:ext cx="978408" cy="484632"/>
+          </a:xfrm>
+          <a:prstGeom prst="rightArrow">
+            <a:avLst/>
+          </a:prstGeom>
+        </p:spPr>
+        <p:style>
+          <a:lnRef idx="2">
+            <a:schemeClr val="accent1">
+              <a:shade val="50000"/>
+            </a:schemeClr>
+          </a:lnRef>
+          <a:fillRef idx="1">
+            <a:schemeClr val="accent1"/>
+          </a:fillRef>
+          <a:effectRef idx="0">
+            <a:schemeClr val="accent1"/>
+          </a:effectRef>
+          <a:fontRef idx="minor">
+            <a:schemeClr val="lt1"/>
+          </a:fontRef>
+        </p:style>
+        <p:txBody>
+          <a:bodyPr rtlCol="0" anchor="ctr"/>
+          <a:lstStyle/>
+          <a:p>
+            <a:pPr algn="ctr"/>
+            <a:endParaRPr lang="es-ES"/>
+          </a:p>
+        </p:txBody>
+      </p:sp>
+    </p:spTree>
+    <p:extLst>
+      <p:ext uri="{BB962C8B-B14F-4D97-AF65-F5344CB8AC3E}">
+        <p14:creationId xmlns:p14="http://schemas.microsoft.com/office/powerpoint/2010/main" val="3067007528"/>
+      </p:ext>
+    </p:extLst>
+  </p:cSld>
+  <p:clrMapOvr>
+    <a:masterClrMapping/>
+  </p:clrMapOvr>
+</p:sld>
+</file>
+
+<file path=ppt/slides/slide19.xml><?xml version="1.0" encoding="utf-8"?>
+<p:sld xmlns:a="http://schemas.openxmlformats.org/drawingml/2006/main" xmlns:r="http://schemas.openxmlformats.org/officeDocument/2006/relationships" xmlns:p="http://schemas.openxmlformats.org/presentationml/2006/main">
+  <p:cSld>
+    <p:spTree>
+      <p:nvGrpSpPr>
+        <p:cNvPr id="1" name=""/>
+        <p:cNvGrpSpPr/>
+        <p:nvPr/>
+      </p:nvGrpSpPr>
+      <p:grpSpPr>
+        <a:xfrm>
+          <a:off x="0" y="0"/>
+          <a:ext cx="0" cy="0"/>
+          <a:chOff x="0" y="0"/>
+          <a:chExt cx="0" cy="0"/>
+        </a:xfrm>
+      </p:grpSpPr>
+      <p:sp>
+        <p:nvSpPr>
+          <p:cNvPr id="2" name="Título 1">
+            <a:extLst>
+              <a:ext uri="{FF2B5EF4-FFF2-40B4-BE49-F238E27FC236}">
+                <a16:creationId xmlns:a16="http://schemas.microsoft.com/office/drawing/2014/main" id="{533FB2AE-CF01-4CDC-9202-BA43247937AE}"/>
+              </a:ext>
+            </a:extLst>
+          </p:cNvPr>
+          <p:cNvSpPr>
+            <a:spLocks noGrp="1"/>
+          </p:cNvSpPr>
+          <p:nvPr>
+            <p:ph type="title"/>
+          </p:nvPr>
+        </p:nvSpPr>
+        <p:spPr/>
+        <p:txBody>
+          <a:bodyPr/>
+          <a:lstStyle/>
+          <a:p>
+            <a:r>
+              <a:rPr lang="es-ES" dirty="0"/>
+              <a:t>Sentencia </a:t>
+            </a:r>
+            <a:r>
+              <a:rPr lang="es-ES" b="1" dirty="0" err="1"/>
+              <a:t>if</a:t>
+            </a:r>
+            <a:r>
+              <a:rPr lang="es-ES" dirty="0"/>
+              <a:t> III(Vídeos 15, 16, 17 y 18)</a:t>
+            </a:r>
+          </a:p>
+        </p:txBody>
+      </p:sp>
+      <p:sp>
+        <p:nvSpPr>
+          <p:cNvPr id="3" name="Marcador de contenido 2">
+            <a:extLst>
+              <a:ext uri="{FF2B5EF4-FFF2-40B4-BE49-F238E27FC236}">
+                <a16:creationId xmlns:a16="http://schemas.microsoft.com/office/drawing/2014/main" id="{67FA667E-4466-4D56-A866-7CD9E88DB622}"/>
+              </a:ext>
+            </a:extLst>
+          </p:cNvPr>
+          <p:cNvSpPr>
+            <a:spLocks noGrp="1"/>
+          </p:cNvSpPr>
+          <p:nvPr>
+            <p:ph idx="1"/>
+          </p:nvPr>
+        </p:nvSpPr>
+        <p:spPr/>
+        <p:txBody>
+          <a:bodyPr>
+            <a:normAutofit lnSpcReduction="10000"/>
+          </a:bodyPr>
+          <a:lstStyle/>
+          <a:p>
+            <a:r>
+              <a:rPr lang="es-ES" dirty="0"/>
+              <a:t>Operadores condicionales:</a:t>
+            </a:r>
+          </a:p>
+          <a:p>
+            <a:pPr lvl="1"/>
+            <a:r>
+              <a:rPr lang="es-ES" b="1" dirty="0"/>
+              <a:t>&amp;</a:t>
+            </a:r>
+            <a:r>
+              <a:rPr lang="es-ES" dirty="0"/>
+              <a:t>: Y</a:t>
+            </a:r>
+          </a:p>
+          <a:p>
+            <a:pPr lvl="1"/>
+            <a:r>
+              <a:rPr lang="es-ES" b="1" dirty="0"/>
+              <a:t>||</a:t>
+            </a:r>
+            <a:r>
+              <a:rPr lang="es-ES" dirty="0"/>
+              <a:t>: O</a:t>
+            </a:r>
+          </a:p>
+          <a:p>
+            <a:r>
+              <a:rPr lang="es-ES" dirty="0"/>
+              <a:t>Los </a:t>
+            </a:r>
+            <a:r>
+              <a:rPr lang="es-ES" b="1" dirty="0" err="1"/>
+              <a:t>if</a:t>
+            </a:r>
+            <a:r>
+              <a:rPr lang="es-ES" dirty="0"/>
+              <a:t> también pueden contener un </a:t>
+            </a:r>
+            <a:r>
+              <a:rPr lang="es-ES" b="1" dirty="0" err="1"/>
+              <a:t>else</a:t>
+            </a:r>
+            <a:r>
+              <a:rPr lang="es-ES" b="1" dirty="0"/>
+              <a:t> </a:t>
+            </a:r>
+            <a:r>
+              <a:rPr lang="es-ES" b="1" dirty="0" err="1"/>
+              <a:t>if</a:t>
+            </a:r>
+            <a:r>
+              <a:rPr lang="es-ES" dirty="0"/>
+              <a:t>:</a:t>
+            </a:r>
+          </a:p>
+          <a:p>
+            <a:pPr marL="457200" lvl="1" indent="0">
+              <a:buNone/>
+            </a:pPr>
+            <a:r>
+              <a:rPr lang="es-ES" i="1" dirty="0" err="1"/>
+              <a:t>if</a:t>
+            </a:r>
+            <a:r>
+              <a:rPr lang="es-ES" i="1" dirty="0"/>
+              <a:t> (&lt;condición 1&gt;){</a:t>
+            </a:r>
+          </a:p>
+          <a:p>
+            <a:pPr marL="457200" lvl="1" indent="0">
+              <a:buNone/>
+            </a:pPr>
+            <a:r>
+              <a:rPr lang="es-ES" i="1" dirty="0"/>
+              <a:t>	//instrucciones</a:t>
+            </a:r>
+          </a:p>
+          <a:p>
+            <a:pPr marL="457200" lvl="1" indent="0">
+              <a:buNone/>
+            </a:pPr>
+            <a:r>
+              <a:rPr lang="es-ES" i="1" dirty="0"/>
+              <a:t>} </a:t>
+            </a:r>
+            <a:r>
+              <a:rPr lang="es-ES" i="1" dirty="0" err="1"/>
+              <a:t>else</a:t>
+            </a:r>
+            <a:r>
+              <a:rPr lang="es-ES" i="1" dirty="0"/>
+              <a:t> </a:t>
+            </a:r>
+            <a:r>
+              <a:rPr lang="es-ES" i="1" dirty="0" err="1"/>
+              <a:t>if</a:t>
+            </a:r>
+            <a:r>
+              <a:rPr lang="es-ES" i="1" dirty="0"/>
+              <a:t> (&lt;condición 2&gt;){</a:t>
+            </a:r>
+          </a:p>
+          <a:p>
+            <a:pPr marL="457200" lvl="1" indent="0">
+              <a:buNone/>
+            </a:pPr>
+            <a:r>
+              <a:rPr lang="es-ES" i="1" dirty="0"/>
+              <a:t>	//instrucciones</a:t>
+            </a:r>
+          </a:p>
+          <a:p>
+            <a:pPr marL="457200" lvl="1" indent="0">
+              <a:buNone/>
+            </a:pPr>
+            <a:r>
+              <a:rPr lang="es-ES" i="1" dirty="0"/>
+              <a:t>} </a:t>
+            </a:r>
+            <a:r>
+              <a:rPr lang="es-ES" i="1" dirty="0" err="1"/>
+              <a:t>else</a:t>
+            </a:r>
+            <a:r>
+              <a:rPr lang="es-ES" i="1" dirty="0"/>
+              <a:t> {</a:t>
+            </a:r>
+          </a:p>
+          <a:p>
+            <a:pPr marL="457200" lvl="1" indent="0">
+              <a:buNone/>
+            </a:pPr>
+            <a:r>
+              <a:rPr lang="es-ES" i="1" dirty="0"/>
+              <a:t>	//instrucciones</a:t>
+            </a:r>
+          </a:p>
+          <a:p>
+            <a:pPr marL="457200" lvl="1" indent="0">
+              <a:buNone/>
+            </a:pPr>
+            <a:r>
+              <a:rPr lang="es-ES" i="1" dirty="0"/>
+              <a:t>}</a:t>
+            </a:r>
+          </a:p>
+          <a:p>
+            <a:pPr marL="457200" lvl="1" indent="0">
+              <a:buNone/>
+            </a:pPr>
+            <a:endParaRPr lang="es-ES" i="1" dirty="0"/>
+          </a:p>
+          <a:p>
+            <a:endParaRPr lang="es-ES" dirty="0"/>
+          </a:p>
+        </p:txBody>
+      </p:sp>
+      <p:sp>
+        <p:nvSpPr>
+          <p:cNvPr id="4" name="Flecha: a la derecha 3">
+            <a:extLst>
+              <a:ext uri="{FF2B5EF4-FFF2-40B4-BE49-F238E27FC236}">
+                <a16:creationId xmlns:a16="http://schemas.microsoft.com/office/drawing/2014/main" id="{28C3D965-0BDA-4984-8CF7-2E40AD8F2EB2}"/>
+              </a:ext>
+            </a:extLst>
+          </p:cNvPr>
+          <p:cNvSpPr/>
+          <p:nvPr/>
+        </p:nvSpPr>
+        <p:spPr>
+          <a:xfrm>
+            <a:off x="10375392" y="5692331"/>
+            <a:ext cx="978408" cy="484632"/>
+          </a:xfrm>
+          <a:prstGeom prst="rightArrow">
+            <a:avLst/>
+          </a:prstGeom>
+        </p:spPr>
+        <p:style>
+          <a:lnRef idx="2">
+            <a:schemeClr val="accent1">
+              <a:shade val="50000"/>
+            </a:schemeClr>
+          </a:lnRef>
+          <a:fillRef idx="1">
+            <a:schemeClr val="accent1"/>
+          </a:fillRef>
+          <a:effectRef idx="0">
+            <a:schemeClr val="accent1"/>
+          </a:effectRef>
+          <a:fontRef idx="minor">
+            <a:schemeClr val="lt1"/>
+          </a:fontRef>
+        </p:style>
+        <p:txBody>
+          <a:bodyPr rtlCol="0" anchor="ctr"/>
+          <a:lstStyle/>
+          <a:p>
+            <a:pPr algn="ctr"/>
+            <a:endParaRPr lang="es-ES"/>
+          </a:p>
+        </p:txBody>
+      </p:sp>
+    </p:spTree>
+    <p:extLst>
+      <p:ext uri="{BB962C8B-B14F-4D97-AF65-F5344CB8AC3E}">
+        <p14:creationId xmlns:p14="http://schemas.microsoft.com/office/powerpoint/2010/main" val="2223648308"/>
+      </p:ext>
+    </p:extLst>
+  </p:cSld>
+  <p:clrMapOvr>
+    <a:masterClrMapping/>
+  </p:clrMapOvr>
+</p:sld>
+</file>
+
 <file path=ppt/slides/slide2.xml><?xml version="1.0" encoding="utf-8"?>
 <p:sld xmlns:a="http://schemas.openxmlformats.org/drawingml/2006/main" xmlns:r="http://schemas.openxmlformats.org/officeDocument/2006/relationships" xmlns:p="http://schemas.openxmlformats.org/presentationml/2006/main">
   <p:cSld>
@@ -3503,6 +5499,1632 @@
     <p:extLst>
       <p:ext uri="{BB962C8B-B14F-4D97-AF65-F5344CB8AC3E}">
         <p14:creationId xmlns:p14="http://schemas.microsoft.com/office/powerpoint/2010/main" val="3922897087"/>
+      </p:ext>
+    </p:extLst>
+  </p:cSld>
+  <p:clrMapOvr>
+    <a:masterClrMapping/>
+  </p:clrMapOvr>
+</p:sld>
+</file>
+
+<file path=ppt/slides/slide20.xml><?xml version="1.0" encoding="utf-8"?>
+<p:sld xmlns:a="http://schemas.openxmlformats.org/drawingml/2006/main" xmlns:r="http://schemas.openxmlformats.org/officeDocument/2006/relationships" xmlns:p="http://schemas.openxmlformats.org/presentationml/2006/main">
+  <p:cSld>
+    <p:spTree>
+      <p:nvGrpSpPr>
+        <p:cNvPr id="1" name=""/>
+        <p:cNvGrpSpPr/>
+        <p:nvPr/>
+      </p:nvGrpSpPr>
+      <p:grpSpPr>
+        <a:xfrm>
+          <a:off x="0" y="0"/>
+          <a:ext cx="0" cy="0"/>
+          <a:chOff x="0" y="0"/>
+          <a:chExt cx="0" cy="0"/>
+        </a:xfrm>
+      </p:grpSpPr>
+      <p:sp>
+        <p:nvSpPr>
+          <p:cNvPr id="2" name="Título 1">
+            <a:extLst>
+              <a:ext uri="{FF2B5EF4-FFF2-40B4-BE49-F238E27FC236}">
+                <a16:creationId xmlns:a16="http://schemas.microsoft.com/office/drawing/2014/main" id="{CE9D1EB2-8698-4967-A22F-B92E659075EA}"/>
+              </a:ext>
+            </a:extLst>
+          </p:cNvPr>
+          <p:cNvSpPr>
+            <a:spLocks noGrp="1"/>
+          </p:cNvSpPr>
+          <p:nvPr>
+            <p:ph type="title"/>
+          </p:nvPr>
+        </p:nvSpPr>
+        <p:spPr/>
+        <p:txBody>
+          <a:bodyPr/>
+          <a:lstStyle/>
+          <a:p>
+            <a:r>
+              <a:rPr lang="es-ES" dirty="0"/>
+              <a:t>Sentencia </a:t>
+            </a:r>
+            <a:r>
+              <a:rPr lang="es-ES" b="1" dirty="0" err="1"/>
+              <a:t>if</a:t>
+            </a:r>
+            <a:r>
+              <a:rPr lang="es-ES" dirty="0"/>
+              <a:t> IV(Vídeos 15, 16, 17 y 18)</a:t>
+            </a:r>
+          </a:p>
+        </p:txBody>
+      </p:sp>
+      <p:sp>
+        <p:nvSpPr>
+          <p:cNvPr id="3" name="Marcador de contenido 2">
+            <a:extLst>
+              <a:ext uri="{FF2B5EF4-FFF2-40B4-BE49-F238E27FC236}">
+                <a16:creationId xmlns:a16="http://schemas.microsoft.com/office/drawing/2014/main" id="{0EABC28B-3B71-49D2-A860-27E0F62E80D6}"/>
+              </a:ext>
+            </a:extLst>
+          </p:cNvPr>
+          <p:cNvSpPr>
+            <a:spLocks noGrp="1"/>
+          </p:cNvSpPr>
+          <p:nvPr>
+            <p:ph idx="1"/>
+          </p:nvPr>
+        </p:nvSpPr>
+        <p:spPr/>
+        <p:txBody>
+          <a:bodyPr/>
+          <a:lstStyle/>
+          <a:p>
+            <a:r>
+              <a:rPr lang="es-ES" dirty="0"/>
+              <a:t> Los </a:t>
+            </a:r>
+            <a:r>
+              <a:rPr lang="es-ES" b="1" dirty="0" err="1"/>
+              <a:t>if</a:t>
+            </a:r>
+            <a:r>
+              <a:rPr lang="es-ES" b="1" dirty="0"/>
+              <a:t> </a:t>
+            </a:r>
+            <a:r>
+              <a:rPr lang="es-ES" dirty="0"/>
+              <a:t>se puede anidar:</a:t>
+            </a:r>
+          </a:p>
+          <a:p>
+            <a:pPr marL="457200" lvl="1" indent="0">
+              <a:buNone/>
+            </a:pPr>
+            <a:r>
+              <a:rPr lang="es-ES" i="1" dirty="0" err="1"/>
+              <a:t>if</a:t>
+            </a:r>
+            <a:r>
+              <a:rPr lang="es-ES" i="1" dirty="0"/>
+              <a:t> (&lt;condición 1&gt;){</a:t>
+            </a:r>
+          </a:p>
+          <a:p>
+            <a:pPr marL="457200" lvl="1" indent="0">
+              <a:buNone/>
+            </a:pPr>
+            <a:r>
+              <a:rPr lang="es-ES" i="1" dirty="0"/>
+              <a:t>	//instrucciones</a:t>
+            </a:r>
+          </a:p>
+          <a:p>
+            <a:pPr marL="457200" lvl="1" indent="0">
+              <a:buNone/>
+            </a:pPr>
+            <a:r>
+              <a:rPr lang="es-ES" i="1" dirty="0"/>
+              <a:t>	</a:t>
+            </a:r>
+            <a:r>
+              <a:rPr lang="es-ES" i="1" dirty="0" err="1"/>
+              <a:t>if</a:t>
+            </a:r>
+            <a:r>
+              <a:rPr lang="es-ES" i="1" dirty="0"/>
+              <a:t> (&lt;condición 2&gt;){</a:t>
+            </a:r>
+          </a:p>
+          <a:p>
+            <a:pPr marL="457200" lvl="1" indent="0">
+              <a:buNone/>
+            </a:pPr>
+            <a:r>
+              <a:rPr lang="es-ES" i="1" dirty="0"/>
+              <a:t>		//instrucciones</a:t>
+            </a:r>
+          </a:p>
+          <a:p>
+            <a:pPr marL="457200" lvl="1" indent="0">
+              <a:buNone/>
+            </a:pPr>
+            <a:r>
+              <a:rPr lang="es-ES" i="1" dirty="0"/>
+              <a:t>	}</a:t>
+            </a:r>
+          </a:p>
+          <a:p>
+            <a:pPr marL="457200" lvl="1" indent="0">
+              <a:buNone/>
+            </a:pPr>
+            <a:r>
+              <a:rPr lang="es-ES" i="1" dirty="0"/>
+              <a:t>} </a:t>
+            </a:r>
+            <a:r>
+              <a:rPr lang="es-ES" i="1" dirty="0" err="1"/>
+              <a:t>else</a:t>
+            </a:r>
+            <a:r>
+              <a:rPr lang="es-ES" i="1" dirty="0"/>
+              <a:t> {</a:t>
+            </a:r>
+          </a:p>
+          <a:p>
+            <a:pPr marL="457200" lvl="1" indent="0">
+              <a:buNone/>
+            </a:pPr>
+            <a:r>
+              <a:rPr lang="es-ES" i="1" dirty="0"/>
+              <a:t>	//instrucciones</a:t>
+            </a:r>
+          </a:p>
+          <a:p>
+            <a:pPr marL="457200" lvl="1" indent="0">
+              <a:buNone/>
+            </a:pPr>
+            <a:r>
+              <a:rPr lang="es-ES" i="1" dirty="0"/>
+              <a:t>}</a:t>
+            </a:r>
+          </a:p>
+        </p:txBody>
+      </p:sp>
+    </p:spTree>
+    <p:extLst>
+      <p:ext uri="{BB962C8B-B14F-4D97-AF65-F5344CB8AC3E}">
+        <p14:creationId xmlns:p14="http://schemas.microsoft.com/office/powerpoint/2010/main" val="2947104710"/>
+      </p:ext>
+    </p:extLst>
+  </p:cSld>
+  <p:clrMapOvr>
+    <a:masterClrMapping/>
+  </p:clrMapOvr>
+</p:sld>
+</file>
+
+<file path=ppt/slides/slide21.xml><?xml version="1.0" encoding="utf-8"?>
+<p:sld xmlns:a="http://schemas.openxmlformats.org/drawingml/2006/main" xmlns:r="http://schemas.openxmlformats.org/officeDocument/2006/relationships" xmlns:p="http://schemas.openxmlformats.org/presentationml/2006/main">
+  <p:cSld>
+    <p:spTree>
+      <p:nvGrpSpPr>
+        <p:cNvPr id="1" name=""/>
+        <p:cNvGrpSpPr/>
+        <p:nvPr/>
+      </p:nvGrpSpPr>
+      <p:grpSpPr>
+        <a:xfrm>
+          <a:off x="0" y="0"/>
+          <a:ext cx="0" cy="0"/>
+          <a:chOff x="0" y="0"/>
+          <a:chExt cx="0" cy="0"/>
+        </a:xfrm>
+      </p:grpSpPr>
+      <p:sp>
+        <p:nvSpPr>
+          <p:cNvPr id="2" name="Título 1">
+            <a:extLst>
+              <a:ext uri="{FF2B5EF4-FFF2-40B4-BE49-F238E27FC236}">
+                <a16:creationId xmlns:a16="http://schemas.microsoft.com/office/drawing/2014/main" id="{281716F3-57D2-4E95-A762-12F3CB9406C1}"/>
+              </a:ext>
+            </a:extLst>
+          </p:cNvPr>
+          <p:cNvSpPr>
+            <a:spLocks noGrp="1"/>
+          </p:cNvSpPr>
+          <p:nvPr>
+            <p:ph type="title"/>
+          </p:nvPr>
+        </p:nvSpPr>
+        <p:spPr/>
+        <p:txBody>
+          <a:bodyPr/>
+          <a:lstStyle/>
+          <a:p>
+            <a:r>
+              <a:rPr lang="es-ES" dirty="0"/>
+              <a:t>Sentencia </a:t>
+            </a:r>
+            <a:r>
+              <a:rPr lang="es-ES" b="1" dirty="0" err="1"/>
+              <a:t>Switch</a:t>
+            </a:r>
+            <a:r>
+              <a:rPr lang="es-ES" dirty="0"/>
+              <a:t> I(Vídeos 19 y 20)</a:t>
+            </a:r>
+          </a:p>
+        </p:txBody>
+      </p:sp>
+      <p:sp>
+        <p:nvSpPr>
+          <p:cNvPr id="3" name="Marcador de contenido 2">
+            <a:extLst>
+              <a:ext uri="{FF2B5EF4-FFF2-40B4-BE49-F238E27FC236}">
+                <a16:creationId xmlns:a16="http://schemas.microsoft.com/office/drawing/2014/main" id="{D95283CE-6055-4DC0-A04F-8E02FB30F282}"/>
+              </a:ext>
+            </a:extLst>
+          </p:cNvPr>
+          <p:cNvSpPr>
+            <a:spLocks noGrp="1"/>
+          </p:cNvSpPr>
+          <p:nvPr>
+            <p:ph idx="1"/>
+          </p:nvPr>
+        </p:nvSpPr>
+        <p:spPr/>
+        <p:txBody>
+          <a:bodyPr>
+            <a:normAutofit fontScale="92500" lnSpcReduction="20000"/>
+          </a:bodyPr>
+          <a:lstStyle/>
+          <a:p>
+            <a:r>
+              <a:rPr lang="es-ES" dirty="0"/>
+              <a:t>La sintaxis es:</a:t>
+            </a:r>
+          </a:p>
+          <a:p>
+            <a:pPr marL="457200" lvl="1" indent="0">
+              <a:buNone/>
+            </a:pPr>
+            <a:r>
+              <a:rPr lang="es-ES" sz="1600" i="1" dirty="0" err="1"/>
+              <a:t>Switch</a:t>
+            </a:r>
+            <a:r>
+              <a:rPr lang="es-ES" sz="1600" i="1" dirty="0"/>
+              <a:t> (&lt;variable a evaluar&gt;){</a:t>
+            </a:r>
+          </a:p>
+          <a:p>
+            <a:pPr marL="457200" lvl="1" indent="0">
+              <a:buNone/>
+            </a:pPr>
+            <a:r>
+              <a:rPr lang="es-ES" sz="1600" i="1" dirty="0"/>
+              <a:t>	case &lt;valor1&gt;:</a:t>
+            </a:r>
+          </a:p>
+          <a:p>
+            <a:pPr marL="457200" lvl="1" indent="0">
+              <a:buNone/>
+            </a:pPr>
+            <a:r>
+              <a:rPr lang="es-ES" sz="1600" i="1" dirty="0"/>
+              <a:t>		//instrucciones</a:t>
+            </a:r>
+          </a:p>
+          <a:p>
+            <a:pPr marL="457200" lvl="1" indent="0">
+              <a:buNone/>
+            </a:pPr>
+            <a:r>
+              <a:rPr lang="es-ES" sz="1600" i="1" dirty="0"/>
+              <a:t>		break;</a:t>
+            </a:r>
+          </a:p>
+          <a:p>
+            <a:pPr marL="457200" lvl="1" indent="0">
+              <a:buNone/>
+            </a:pPr>
+            <a:r>
+              <a:rPr lang="es-ES" sz="1600" i="1" dirty="0"/>
+              <a:t>	case &lt;valor2&gt;:</a:t>
+            </a:r>
+          </a:p>
+          <a:p>
+            <a:pPr marL="457200" lvl="1" indent="0">
+              <a:buNone/>
+            </a:pPr>
+            <a:r>
+              <a:rPr lang="es-ES" sz="1600" i="1" dirty="0"/>
+              <a:t>		//instrucciones</a:t>
+            </a:r>
+          </a:p>
+          <a:p>
+            <a:pPr marL="457200" lvl="1" indent="0">
+              <a:buNone/>
+            </a:pPr>
+            <a:r>
+              <a:rPr lang="es-ES" sz="1600" i="1" dirty="0"/>
+              <a:t>		break;</a:t>
+            </a:r>
+          </a:p>
+          <a:p>
+            <a:pPr marL="457200" lvl="1" indent="0">
+              <a:buNone/>
+            </a:pPr>
+            <a:r>
+              <a:rPr lang="es-ES" sz="1600" i="1" dirty="0"/>
+              <a:t>	.</a:t>
+            </a:r>
+          </a:p>
+          <a:p>
+            <a:pPr marL="457200" lvl="1" indent="0">
+              <a:buNone/>
+            </a:pPr>
+            <a:r>
+              <a:rPr lang="es-ES" sz="1600" i="1" dirty="0"/>
+              <a:t>	.</a:t>
+            </a:r>
+          </a:p>
+          <a:p>
+            <a:pPr marL="457200" lvl="1" indent="0">
+              <a:buNone/>
+            </a:pPr>
+            <a:r>
+              <a:rPr lang="es-ES" sz="1600" i="1" dirty="0"/>
+              <a:t>	.</a:t>
+            </a:r>
+          </a:p>
+          <a:p>
+            <a:pPr marL="457200" lvl="1" indent="0">
+              <a:buNone/>
+            </a:pPr>
+            <a:r>
+              <a:rPr lang="es-ES" sz="1600" i="1" dirty="0"/>
+              <a:t>	case &lt;</a:t>
+            </a:r>
+            <a:r>
+              <a:rPr lang="es-ES" sz="1600" i="1" dirty="0" err="1"/>
+              <a:t>valorN</a:t>
+            </a:r>
+            <a:r>
+              <a:rPr lang="es-ES" sz="1600" i="1" dirty="0"/>
+              <a:t>&gt;:</a:t>
+            </a:r>
+          </a:p>
+          <a:p>
+            <a:pPr marL="457200" lvl="1" indent="0">
+              <a:buNone/>
+            </a:pPr>
+            <a:r>
+              <a:rPr lang="es-ES" sz="1600" i="1" dirty="0"/>
+              <a:t>		//instrucciones</a:t>
+            </a:r>
+          </a:p>
+          <a:p>
+            <a:pPr marL="457200" lvl="1" indent="0">
+              <a:buNone/>
+            </a:pPr>
+            <a:r>
+              <a:rPr lang="es-ES" sz="1600" i="1" dirty="0"/>
+              <a:t>		break;</a:t>
+            </a:r>
+          </a:p>
+          <a:p>
+            <a:pPr marL="457200" lvl="1" indent="0">
+              <a:buNone/>
+            </a:pPr>
+            <a:r>
+              <a:rPr lang="es-ES" sz="1600" i="1" dirty="0"/>
+              <a:t>	default:</a:t>
+            </a:r>
+          </a:p>
+          <a:p>
+            <a:pPr marL="457200" lvl="1" indent="0">
+              <a:buNone/>
+            </a:pPr>
+            <a:r>
+              <a:rPr lang="es-ES" sz="1600" i="1" dirty="0"/>
+              <a:t>		//instrucciones</a:t>
+            </a:r>
+          </a:p>
+          <a:p>
+            <a:pPr marL="457200" lvl="1" indent="0">
+              <a:buNone/>
+            </a:pPr>
+            <a:r>
+              <a:rPr lang="es-ES" sz="1600" i="1" dirty="0"/>
+              <a:t>		break;</a:t>
+            </a:r>
+          </a:p>
+          <a:p>
+            <a:pPr marL="457200" lvl="1" indent="0">
+              <a:buNone/>
+            </a:pPr>
+            <a:r>
+              <a:rPr lang="es-ES" sz="1600" i="1" dirty="0"/>
+              <a:t>}</a:t>
+            </a:r>
+          </a:p>
+          <a:p>
+            <a:pPr marL="457200" lvl="1" indent="0">
+              <a:buNone/>
+            </a:pPr>
+            <a:endParaRPr lang="es-ES" i="1" dirty="0"/>
+          </a:p>
+          <a:p>
+            <a:pPr marL="457200" lvl="1" indent="0">
+              <a:buNone/>
+            </a:pPr>
+            <a:endParaRPr lang="es-ES" i="1" dirty="0"/>
+          </a:p>
+        </p:txBody>
+      </p:sp>
+    </p:spTree>
+    <p:extLst>
+      <p:ext uri="{BB962C8B-B14F-4D97-AF65-F5344CB8AC3E}">
+        <p14:creationId xmlns:p14="http://schemas.microsoft.com/office/powerpoint/2010/main" val="1639512831"/>
+      </p:ext>
+    </p:extLst>
+  </p:cSld>
+  <p:clrMapOvr>
+    <a:masterClrMapping/>
+  </p:clrMapOvr>
+</p:sld>
+</file>
+
+<file path=ppt/slides/slide22.xml><?xml version="1.0" encoding="utf-8"?>
+<p:sld xmlns:a="http://schemas.openxmlformats.org/drawingml/2006/main" xmlns:r="http://schemas.openxmlformats.org/officeDocument/2006/relationships" xmlns:p="http://schemas.openxmlformats.org/presentationml/2006/main">
+  <p:cSld>
+    <p:spTree>
+      <p:nvGrpSpPr>
+        <p:cNvPr id="1" name=""/>
+        <p:cNvGrpSpPr/>
+        <p:nvPr/>
+      </p:nvGrpSpPr>
+      <p:grpSpPr>
+        <a:xfrm>
+          <a:off x="0" y="0"/>
+          <a:ext cx="0" cy="0"/>
+          <a:chOff x="0" y="0"/>
+          <a:chExt cx="0" cy="0"/>
+        </a:xfrm>
+      </p:grpSpPr>
+      <p:sp>
+        <p:nvSpPr>
+          <p:cNvPr id="2" name="Título 1">
+            <a:extLst>
+              <a:ext uri="{FF2B5EF4-FFF2-40B4-BE49-F238E27FC236}">
+                <a16:creationId xmlns:a16="http://schemas.microsoft.com/office/drawing/2014/main" id="{86266EA9-03CD-4317-B416-ADA6FB803F8F}"/>
+              </a:ext>
+            </a:extLst>
+          </p:cNvPr>
+          <p:cNvSpPr>
+            <a:spLocks noGrp="1"/>
+          </p:cNvSpPr>
+          <p:nvPr>
+            <p:ph type="title"/>
+          </p:nvPr>
+        </p:nvSpPr>
+        <p:spPr/>
+        <p:txBody>
+          <a:bodyPr/>
+          <a:lstStyle/>
+          <a:p>
+            <a:r>
+              <a:rPr lang="es-ES" dirty="0"/>
+              <a:t>Sentencia </a:t>
+            </a:r>
+            <a:r>
+              <a:rPr lang="es-ES" b="1" dirty="0" err="1"/>
+              <a:t>Switch</a:t>
+            </a:r>
+            <a:r>
+              <a:rPr lang="es-ES" dirty="0"/>
+              <a:t> II(Vídeos 19 y 20)</a:t>
+            </a:r>
+          </a:p>
+        </p:txBody>
+      </p:sp>
+      <p:sp>
+        <p:nvSpPr>
+          <p:cNvPr id="3" name="Marcador de contenido 2">
+            <a:extLst>
+              <a:ext uri="{FF2B5EF4-FFF2-40B4-BE49-F238E27FC236}">
+                <a16:creationId xmlns:a16="http://schemas.microsoft.com/office/drawing/2014/main" id="{1D64BD7C-71B9-494D-AEF8-40DDD55D29BE}"/>
+              </a:ext>
+            </a:extLst>
+          </p:cNvPr>
+          <p:cNvSpPr>
+            <a:spLocks noGrp="1"/>
+          </p:cNvSpPr>
+          <p:nvPr>
+            <p:ph idx="1"/>
+          </p:nvPr>
+        </p:nvSpPr>
+        <p:spPr/>
+        <p:txBody>
+          <a:bodyPr/>
+          <a:lstStyle/>
+          <a:p>
+            <a:r>
+              <a:rPr lang="es-ES" dirty="0"/>
+              <a:t>Las instrucciones que se encuentran dentro del </a:t>
+            </a:r>
+            <a:r>
+              <a:rPr lang="es-ES" b="1" dirty="0"/>
+              <a:t>default</a:t>
+            </a:r>
+            <a:r>
+              <a:rPr lang="es-ES" dirty="0"/>
+              <a:t> sólo se ejecutarán si ninguno de los </a:t>
+            </a:r>
+            <a:r>
+              <a:rPr lang="es-ES" b="1" dirty="0"/>
+              <a:t>case</a:t>
+            </a:r>
+            <a:r>
+              <a:rPr lang="es-ES" dirty="0"/>
+              <a:t> anteriores se cumplen.</a:t>
+            </a:r>
+          </a:p>
+          <a:p>
+            <a:r>
+              <a:rPr lang="es-ES" dirty="0"/>
+              <a:t>Los </a:t>
+            </a:r>
+            <a:r>
+              <a:rPr lang="es-ES" b="1" dirty="0" err="1"/>
+              <a:t>switch</a:t>
+            </a:r>
+            <a:r>
+              <a:rPr lang="es-ES" b="1" dirty="0"/>
+              <a:t> </a:t>
+            </a:r>
+            <a:r>
+              <a:rPr lang="es-ES" dirty="0"/>
+              <a:t>también se pueden anidar, formando parte de las instrucciones que se encuentren dentro de uno de los </a:t>
+            </a:r>
+            <a:r>
+              <a:rPr lang="es-ES" b="1" dirty="0"/>
+              <a:t>case</a:t>
+            </a:r>
+            <a:r>
+              <a:rPr lang="es-ES" dirty="0"/>
+              <a:t>.</a:t>
+            </a:r>
+          </a:p>
+        </p:txBody>
+      </p:sp>
+    </p:spTree>
+    <p:extLst>
+      <p:ext uri="{BB962C8B-B14F-4D97-AF65-F5344CB8AC3E}">
+        <p14:creationId xmlns:p14="http://schemas.microsoft.com/office/powerpoint/2010/main" val="1782550706"/>
+      </p:ext>
+    </p:extLst>
+  </p:cSld>
+  <p:clrMapOvr>
+    <a:masterClrMapping/>
+  </p:clrMapOvr>
+</p:sld>
+</file>
+
+<file path=ppt/slides/slide23.xml><?xml version="1.0" encoding="utf-8"?>
+<p:sld xmlns:a="http://schemas.openxmlformats.org/drawingml/2006/main" xmlns:r="http://schemas.openxmlformats.org/officeDocument/2006/relationships" xmlns:p="http://schemas.openxmlformats.org/presentationml/2006/main">
+  <p:cSld>
+    <p:spTree>
+      <p:nvGrpSpPr>
+        <p:cNvPr id="1" name=""/>
+        <p:cNvGrpSpPr/>
+        <p:nvPr/>
+      </p:nvGrpSpPr>
+      <p:grpSpPr>
+        <a:xfrm>
+          <a:off x="0" y="0"/>
+          <a:ext cx="0" cy="0"/>
+          <a:chOff x="0" y="0"/>
+          <a:chExt cx="0" cy="0"/>
+        </a:xfrm>
+      </p:grpSpPr>
+      <p:sp>
+        <p:nvSpPr>
+          <p:cNvPr id="2" name="Título 1">
+            <a:extLst>
+              <a:ext uri="{FF2B5EF4-FFF2-40B4-BE49-F238E27FC236}">
+                <a16:creationId xmlns:a16="http://schemas.microsoft.com/office/drawing/2014/main" id="{AA880394-2391-47FB-91AD-5EE4179C1509}"/>
+              </a:ext>
+            </a:extLst>
+          </p:cNvPr>
+          <p:cNvSpPr>
+            <a:spLocks noGrp="1"/>
+          </p:cNvSpPr>
+          <p:nvPr>
+            <p:ph type="title"/>
+          </p:nvPr>
+        </p:nvSpPr>
+        <p:spPr/>
+        <p:txBody>
+          <a:bodyPr/>
+          <a:lstStyle/>
+          <a:p>
+            <a:r>
+              <a:rPr lang="es-ES" dirty="0"/>
+              <a:t>Sentencia </a:t>
+            </a:r>
+            <a:r>
+              <a:rPr lang="es-ES" b="1" dirty="0" err="1"/>
+              <a:t>for</a:t>
+            </a:r>
+            <a:r>
+              <a:rPr lang="es-ES" dirty="0"/>
+              <a:t> (Vídeos 21, 22 y 23)</a:t>
+            </a:r>
+          </a:p>
+        </p:txBody>
+      </p:sp>
+      <p:sp>
+        <p:nvSpPr>
+          <p:cNvPr id="3" name="Marcador de contenido 2">
+            <a:extLst>
+              <a:ext uri="{FF2B5EF4-FFF2-40B4-BE49-F238E27FC236}">
+                <a16:creationId xmlns:a16="http://schemas.microsoft.com/office/drawing/2014/main" id="{6B92D261-BED3-4C47-A883-C2427EFB5550}"/>
+              </a:ext>
+            </a:extLst>
+          </p:cNvPr>
+          <p:cNvSpPr>
+            <a:spLocks noGrp="1"/>
+          </p:cNvSpPr>
+          <p:nvPr>
+            <p:ph idx="1"/>
+          </p:nvPr>
+        </p:nvSpPr>
+        <p:spPr/>
+        <p:txBody>
+          <a:bodyPr/>
+          <a:lstStyle/>
+          <a:p>
+            <a:r>
+              <a:rPr lang="es-ES" dirty="0"/>
+              <a:t>La sintaxis es:</a:t>
+            </a:r>
+          </a:p>
+          <a:p>
+            <a:pPr marL="457200" lvl="1" indent="0">
+              <a:buNone/>
+            </a:pPr>
+            <a:r>
+              <a:rPr lang="es-ES" i="1" dirty="0" err="1"/>
+              <a:t>for</a:t>
+            </a:r>
+            <a:r>
+              <a:rPr lang="es-ES" i="1" dirty="0"/>
+              <a:t> (</a:t>
+            </a:r>
+            <a:r>
+              <a:rPr lang="es-ES" i="1" dirty="0" err="1"/>
+              <a:t>int</a:t>
+            </a:r>
+            <a:r>
+              <a:rPr lang="es-ES" i="1" dirty="0"/>
+              <a:t> &lt;variable&gt; = &lt;valor&gt;; &lt;condición&gt;; &lt;cambio del valor de la variable&gt;){</a:t>
+            </a:r>
+          </a:p>
+          <a:p>
+            <a:pPr marL="457200" lvl="1" indent="0">
+              <a:buNone/>
+            </a:pPr>
+            <a:r>
+              <a:rPr lang="es-ES" i="1" dirty="0"/>
+              <a:t>	//instrucciones</a:t>
+            </a:r>
+          </a:p>
+          <a:p>
+            <a:pPr marL="457200" lvl="1" indent="0">
+              <a:buNone/>
+            </a:pPr>
+            <a:r>
+              <a:rPr lang="es-ES" i="1" dirty="0"/>
+              <a:t>}</a:t>
+            </a:r>
+          </a:p>
+          <a:p>
+            <a:r>
+              <a:rPr lang="es-ES" dirty="0"/>
+              <a:t>Para romper la ejecución de un bucle </a:t>
+            </a:r>
+            <a:r>
+              <a:rPr lang="es-ES" b="1" dirty="0" err="1"/>
+              <a:t>for</a:t>
+            </a:r>
+            <a:r>
+              <a:rPr lang="es-ES" dirty="0"/>
+              <a:t> se usa la instrucción </a:t>
+            </a:r>
+            <a:r>
+              <a:rPr lang="es-ES" b="1" dirty="0"/>
+              <a:t>break;</a:t>
+            </a:r>
+          </a:p>
+          <a:p>
+            <a:r>
+              <a:rPr lang="es-ES" dirty="0"/>
+              <a:t>Además del </a:t>
+            </a:r>
+            <a:r>
+              <a:rPr lang="es-ES" b="1" dirty="0"/>
+              <a:t>break</a:t>
+            </a:r>
+            <a:r>
+              <a:rPr lang="es-ES" dirty="0"/>
+              <a:t> se puede usar la instrucción </a:t>
+            </a:r>
+            <a:r>
+              <a:rPr lang="es-ES" b="1" dirty="0" err="1"/>
+              <a:t>continue</a:t>
+            </a:r>
+            <a:r>
+              <a:rPr lang="es-ES" dirty="0"/>
+              <a:t>, que lo que hace es que rompe la iteración que se está ejecutando para pasar a la siguiente.</a:t>
+            </a:r>
+          </a:p>
+        </p:txBody>
+      </p:sp>
+    </p:spTree>
+    <p:extLst>
+      <p:ext uri="{BB962C8B-B14F-4D97-AF65-F5344CB8AC3E}">
+        <p14:creationId xmlns:p14="http://schemas.microsoft.com/office/powerpoint/2010/main" val="1167966791"/>
+      </p:ext>
+    </p:extLst>
+  </p:cSld>
+  <p:clrMapOvr>
+    <a:masterClrMapping/>
+  </p:clrMapOvr>
+</p:sld>
+</file>
+
+<file path=ppt/slides/slide24.xml><?xml version="1.0" encoding="utf-8"?>
+<p:sld xmlns:a="http://schemas.openxmlformats.org/drawingml/2006/main" xmlns:r="http://schemas.openxmlformats.org/officeDocument/2006/relationships" xmlns:p="http://schemas.openxmlformats.org/presentationml/2006/main">
+  <p:cSld>
+    <p:spTree>
+      <p:nvGrpSpPr>
+        <p:cNvPr id="1" name=""/>
+        <p:cNvGrpSpPr/>
+        <p:nvPr/>
+      </p:nvGrpSpPr>
+      <p:grpSpPr>
+        <a:xfrm>
+          <a:off x="0" y="0"/>
+          <a:ext cx="0" cy="0"/>
+          <a:chOff x="0" y="0"/>
+          <a:chExt cx="0" cy="0"/>
+        </a:xfrm>
+      </p:grpSpPr>
+      <p:sp>
+        <p:nvSpPr>
+          <p:cNvPr id="2" name="Título 1">
+            <a:extLst>
+              <a:ext uri="{FF2B5EF4-FFF2-40B4-BE49-F238E27FC236}">
+                <a16:creationId xmlns:a16="http://schemas.microsoft.com/office/drawing/2014/main" id="{2784A084-FBB0-48D2-879B-CF08A4282AFF}"/>
+              </a:ext>
+            </a:extLst>
+          </p:cNvPr>
+          <p:cNvSpPr>
+            <a:spLocks noGrp="1"/>
+          </p:cNvSpPr>
+          <p:nvPr>
+            <p:ph type="title"/>
+          </p:nvPr>
+        </p:nvSpPr>
+        <p:spPr/>
+        <p:txBody>
+          <a:bodyPr/>
+          <a:lstStyle/>
+          <a:p>
+            <a:r>
+              <a:rPr lang="es-ES" dirty="0"/>
+              <a:t>Sentencia </a:t>
+            </a:r>
+            <a:r>
+              <a:rPr lang="es-ES" b="1" dirty="0" err="1"/>
+              <a:t>while</a:t>
+            </a:r>
+            <a:r>
+              <a:rPr lang="es-ES" dirty="0"/>
+              <a:t> (Vídeo 24)</a:t>
+            </a:r>
+          </a:p>
+        </p:txBody>
+      </p:sp>
+      <p:sp>
+        <p:nvSpPr>
+          <p:cNvPr id="3" name="Marcador de contenido 2">
+            <a:extLst>
+              <a:ext uri="{FF2B5EF4-FFF2-40B4-BE49-F238E27FC236}">
+                <a16:creationId xmlns:a16="http://schemas.microsoft.com/office/drawing/2014/main" id="{570A27DF-4FCF-4510-AED3-4BD6F117F1BE}"/>
+              </a:ext>
+            </a:extLst>
+          </p:cNvPr>
+          <p:cNvSpPr>
+            <a:spLocks noGrp="1"/>
+          </p:cNvSpPr>
+          <p:nvPr>
+            <p:ph idx="1"/>
+          </p:nvPr>
+        </p:nvSpPr>
+        <p:spPr/>
+        <p:txBody>
+          <a:bodyPr/>
+          <a:lstStyle/>
+          <a:p>
+            <a:r>
+              <a:rPr lang="es-ES" dirty="0"/>
+              <a:t>La sintaxis:</a:t>
+            </a:r>
+          </a:p>
+          <a:p>
+            <a:pPr marL="457200" lvl="1" indent="0">
+              <a:buNone/>
+            </a:pPr>
+            <a:r>
+              <a:rPr lang="es-ES" i="1" dirty="0" err="1"/>
+              <a:t>while</a:t>
+            </a:r>
+            <a:r>
+              <a:rPr lang="es-ES" i="1" dirty="0"/>
+              <a:t> (&lt;condición&gt;){</a:t>
+            </a:r>
+          </a:p>
+          <a:p>
+            <a:pPr marL="457200" lvl="1" indent="0">
+              <a:buNone/>
+            </a:pPr>
+            <a:r>
+              <a:rPr lang="es-ES" i="1" dirty="0"/>
+              <a:t>	//instrucciones</a:t>
+            </a:r>
+          </a:p>
+          <a:p>
+            <a:pPr marL="457200" lvl="1" indent="0">
+              <a:buNone/>
+            </a:pPr>
+            <a:r>
+              <a:rPr lang="es-ES" i="1" dirty="0"/>
+              <a:t>}</a:t>
+            </a:r>
+          </a:p>
+        </p:txBody>
+      </p:sp>
+    </p:spTree>
+    <p:extLst>
+      <p:ext uri="{BB962C8B-B14F-4D97-AF65-F5344CB8AC3E}">
+        <p14:creationId xmlns:p14="http://schemas.microsoft.com/office/powerpoint/2010/main" val="874965887"/>
+      </p:ext>
+    </p:extLst>
+  </p:cSld>
+  <p:clrMapOvr>
+    <a:masterClrMapping/>
+  </p:clrMapOvr>
+</p:sld>
+</file>
+
+<file path=ppt/slides/slide25.xml><?xml version="1.0" encoding="utf-8"?>
+<p:sld xmlns:a="http://schemas.openxmlformats.org/drawingml/2006/main" xmlns:r="http://schemas.openxmlformats.org/officeDocument/2006/relationships" xmlns:p="http://schemas.openxmlformats.org/presentationml/2006/main">
+  <p:cSld>
+    <p:spTree>
+      <p:nvGrpSpPr>
+        <p:cNvPr id="1" name=""/>
+        <p:cNvGrpSpPr/>
+        <p:nvPr/>
+      </p:nvGrpSpPr>
+      <p:grpSpPr>
+        <a:xfrm>
+          <a:off x="0" y="0"/>
+          <a:ext cx="0" cy="0"/>
+          <a:chOff x="0" y="0"/>
+          <a:chExt cx="0" cy="0"/>
+        </a:xfrm>
+      </p:grpSpPr>
+      <p:sp>
+        <p:nvSpPr>
+          <p:cNvPr id="2" name="Título 1">
+            <a:extLst>
+              <a:ext uri="{FF2B5EF4-FFF2-40B4-BE49-F238E27FC236}">
+                <a16:creationId xmlns:a16="http://schemas.microsoft.com/office/drawing/2014/main" id="{7D8A99A2-F84F-42D7-9B62-4937B1774A2F}"/>
+              </a:ext>
+            </a:extLst>
+          </p:cNvPr>
+          <p:cNvSpPr>
+            <a:spLocks noGrp="1"/>
+          </p:cNvSpPr>
+          <p:nvPr>
+            <p:ph type="title"/>
+          </p:nvPr>
+        </p:nvSpPr>
+        <p:spPr/>
+        <p:txBody>
+          <a:bodyPr/>
+          <a:lstStyle/>
+          <a:p>
+            <a:r>
+              <a:rPr lang="es-ES" dirty="0"/>
+              <a:t>Sentencia </a:t>
+            </a:r>
+            <a:r>
+              <a:rPr lang="es-ES" b="1" dirty="0"/>
+              <a:t>Do </a:t>
+            </a:r>
+            <a:r>
+              <a:rPr lang="es-ES" b="1" dirty="0" err="1"/>
+              <a:t>while</a:t>
+            </a:r>
+            <a:r>
+              <a:rPr lang="es-ES" dirty="0"/>
+              <a:t> (Vídeo 25)</a:t>
+            </a:r>
+          </a:p>
+        </p:txBody>
+      </p:sp>
+      <p:sp>
+        <p:nvSpPr>
+          <p:cNvPr id="3" name="Marcador de contenido 2">
+            <a:extLst>
+              <a:ext uri="{FF2B5EF4-FFF2-40B4-BE49-F238E27FC236}">
+                <a16:creationId xmlns:a16="http://schemas.microsoft.com/office/drawing/2014/main" id="{B2BE87F3-0C60-43C6-8CF4-00D40D0E210A}"/>
+              </a:ext>
+            </a:extLst>
+          </p:cNvPr>
+          <p:cNvSpPr>
+            <a:spLocks noGrp="1"/>
+          </p:cNvSpPr>
+          <p:nvPr>
+            <p:ph idx="1"/>
+          </p:nvPr>
+        </p:nvSpPr>
+        <p:spPr/>
+        <p:txBody>
+          <a:bodyPr/>
+          <a:lstStyle/>
+          <a:p>
+            <a:r>
+              <a:rPr lang="es-ES" dirty="0"/>
+              <a:t>La sintaxis es: </a:t>
+            </a:r>
+          </a:p>
+          <a:p>
+            <a:pPr marL="457200" lvl="1" indent="0">
+              <a:buNone/>
+            </a:pPr>
+            <a:r>
+              <a:rPr lang="es-ES" i="1" dirty="0"/>
+              <a:t>do {</a:t>
+            </a:r>
+          </a:p>
+          <a:p>
+            <a:pPr marL="457200" lvl="1" indent="0">
+              <a:buNone/>
+            </a:pPr>
+            <a:r>
+              <a:rPr lang="es-ES" i="1" dirty="0"/>
+              <a:t>	//instrucciones</a:t>
+            </a:r>
+          </a:p>
+          <a:p>
+            <a:pPr marL="457200" lvl="1" indent="0">
+              <a:buNone/>
+            </a:pPr>
+            <a:r>
+              <a:rPr lang="es-ES" i="1" dirty="0"/>
+              <a:t>} </a:t>
+            </a:r>
+            <a:r>
+              <a:rPr lang="es-ES" i="1" dirty="0" err="1"/>
+              <a:t>while</a:t>
+            </a:r>
+            <a:r>
+              <a:rPr lang="es-ES" i="1" dirty="0"/>
+              <a:t> (&lt;condición&gt;);</a:t>
+            </a:r>
+          </a:p>
+          <a:p>
+            <a:r>
+              <a:rPr lang="es-ES" dirty="0"/>
+              <a:t>Las instrucciones que contenga este bucle se van a ejecutar al menos, una vez.</a:t>
+            </a:r>
+          </a:p>
+        </p:txBody>
+      </p:sp>
+    </p:spTree>
+    <p:extLst>
+      <p:ext uri="{BB962C8B-B14F-4D97-AF65-F5344CB8AC3E}">
+        <p14:creationId xmlns:p14="http://schemas.microsoft.com/office/powerpoint/2010/main" val="891724390"/>
+      </p:ext>
+    </p:extLst>
+  </p:cSld>
+  <p:clrMapOvr>
+    <a:masterClrMapping/>
+  </p:clrMapOvr>
+</p:sld>
+</file>
+
+<file path=ppt/slides/slide26.xml><?xml version="1.0" encoding="utf-8"?>
+<p:sld xmlns:a="http://schemas.openxmlformats.org/drawingml/2006/main" xmlns:r="http://schemas.openxmlformats.org/officeDocument/2006/relationships" xmlns:p="http://schemas.openxmlformats.org/presentationml/2006/main">
+  <p:cSld>
+    <p:spTree>
+      <p:nvGrpSpPr>
+        <p:cNvPr id="1" name=""/>
+        <p:cNvGrpSpPr/>
+        <p:nvPr/>
+      </p:nvGrpSpPr>
+      <p:grpSpPr>
+        <a:xfrm>
+          <a:off x="0" y="0"/>
+          <a:ext cx="0" cy="0"/>
+          <a:chOff x="0" y="0"/>
+          <a:chExt cx="0" cy="0"/>
+        </a:xfrm>
+      </p:grpSpPr>
+      <p:sp>
+        <p:nvSpPr>
+          <p:cNvPr id="2" name="Título 1">
+            <a:extLst>
+              <a:ext uri="{FF2B5EF4-FFF2-40B4-BE49-F238E27FC236}">
+                <a16:creationId xmlns:a16="http://schemas.microsoft.com/office/drawing/2014/main" id="{F479D8C7-DE13-486A-93EF-54E592D6759B}"/>
+              </a:ext>
+            </a:extLst>
+          </p:cNvPr>
+          <p:cNvSpPr>
+            <a:spLocks noGrp="1"/>
+          </p:cNvSpPr>
+          <p:nvPr>
+            <p:ph type="title"/>
+          </p:nvPr>
+        </p:nvSpPr>
+        <p:spPr/>
+        <p:txBody>
+          <a:bodyPr/>
+          <a:lstStyle/>
+          <a:p>
+            <a:r>
+              <a:rPr lang="es-ES" b="1" dirty="0" err="1"/>
+              <a:t>Arrays</a:t>
+            </a:r>
+            <a:r>
+              <a:rPr lang="es-ES" dirty="0"/>
+              <a:t> (Vídeos 26 y 27)</a:t>
+            </a:r>
+            <a:endParaRPr lang="es-ES" b="1" dirty="0"/>
+          </a:p>
+        </p:txBody>
+      </p:sp>
+      <p:sp>
+        <p:nvSpPr>
+          <p:cNvPr id="3" name="Marcador de contenido 2">
+            <a:extLst>
+              <a:ext uri="{FF2B5EF4-FFF2-40B4-BE49-F238E27FC236}">
+                <a16:creationId xmlns:a16="http://schemas.microsoft.com/office/drawing/2014/main" id="{64377235-D450-4463-9ED7-695C9A009533}"/>
+              </a:ext>
+            </a:extLst>
+          </p:cNvPr>
+          <p:cNvSpPr>
+            <a:spLocks noGrp="1"/>
+          </p:cNvSpPr>
+          <p:nvPr>
+            <p:ph idx="1"/>
+          </p:nvPr>
+        </p:nvSpPr>
+        <p:spPr/>
+        <p:txBody>
+          <a:bodyPr>
+            <a:normAutofit fontScale="92500" lnSpcReduction="20000"/>
+          </a:bodyPr>
+          <a:lstStyle/>
+          <a:p>
+            <a:r>
+              <a:rPr lang="es-ES" dirty="0"/>
+              <a:t>La declaración de un </a:t>
+            </a:r>
+            <a:r>
+              <a:rPr lang="es-ES" b="1" dirty="0"/>
+              <a:t>array</a:t>
+            </a:r>
+            <a:r>
+              <a:rPr lang="es-ES" dirty="0"/>
+              <a:t> se hace así:</a:t>
+            </a:r>
+          </a:p>
+          <a:p>
+            <a:pPr marL="457200" lvl="1" indent="0">
+              <a:buNone/>
+            </a:pPr>
+            <a:r>
+              <a:rPr lang="es-ES" i="1" dirty="0"/>
+              <a:t>&lt;tipo de dato&gt;[] &lt;nombre del array&gt; = new &lt;mismo tipo de dato&gt;[</a:t>
+            </a:r>
+            <a:r>
+              <a:rPr lang="es-ES" i="1" dirty="0" err="1"/>
+              <a:t>nº</a:t>
+            </a:r>
+            <a:r>
+              <a:rPr lang="es-ES" i="1" dirty="0"/>
+              <a:t> de 	posiciones 	que tiene el array&gt;];</a:t>
+            </a:r>
+          </a:p>
+          <a:p>
+            <a:pPr marL="457200" lvl="1" indent="0">
+              <a:buNone/>
+            </a:pPr>
+            <a:r>
+              <a:rPr lang="es-ES" dirty="0"/>
+              <a:t>Por ejemplo:</a:t>
+            </a:r>
+          </a:p>
+          <a:p>
+            <a:pPr marL="457200" lvl="1" indent="0">
+              <a:buNone/>
+            </a:pPr>
+            <a:r>
+              <a:rPr lang="es-ES" dirty="0"/>
+              <a:t>	</a:t>
+            </a:r>
+            <a:r>
+              <a:rPr lang="es-ES" i="1" dirty="0" err="1"/>
+              <a:t>int</a:t>
+            </a:r>
+            <a:r>
+              <a:rPr lang="es-ES" i="1" dirty="0"/>
+              <a:t>[] edades = new </a:t>
+            </a:r>
+            <a:r>
+              <a:rPr lang="es-ES" i="1" dirty="0" err="1"/>
+              <a:t>int</a:t>
+            </a:r>
+            <a:r>
+              <a:rPr lang="es-ES" i="1" dirty="0"/>
+              <a:t>[5];</a:t>
+            </a:r>
+          </a:p>
+          <a:p>
+            <a:r>
+              <a:rPr lang="es-ES" dirty="0"/>
+              <a:t>El primer índice en un </a:t>
+            </a:r>
+            <a:r>
+              <a:rPr lang="es-ES" b="1" dirty="0"/>
+              <a:t>array</a:t>
+            </a:r>
+            <a:r>
+              <a:rPr lang="es-ES" dirty="0"/>
+              <a:t> es el 0.</a:t>
+            </a:r>
+          </a:p>
+          <a:p>
+            <a:r>
+              <a:rPr lang="es-ES" dirty="0"/>
+              <a:t>Para dar un valor a alguna de las posiciones:</a:t>
+            </a:r>
+          </a:p>
+          <a:p>
+            <a:pPr marL="457200" lvl="1" indent="0">
+              <a:buNone/>
+            </a:pPr>
+            <a:r>
+              <a:rPr lang="es-ES" i="1" dirty="0"/>
+              <a:t>&lt;nombre del array&gt;[&lt;posición&gt;] = &lt;valor&gt;;</a:t>
+            </a:r>
+          </a:p>
+          <a:p>
+            <a:r>
+              <a:rPr lang="es-ES" dirty="0"/>
+              <a:t>Para ver el valor de alguna de las posiciones:</a:t>
+            </a:r>
+          </a:p>
+          <a:p>
+            <a:pPr marL="457200" lvl="1" indent="0">
+              <a:buNone/>
+            </a:pPr>
+            <a:r>
+              <a:rPr lang="es-ES" i="1" dirty="0"/>
+              <a:t>&lt;nombre del array&gt;[&lt;posición&gt;];</a:t>
+            </a:r>
+          </a:p>
+          <a:p>
+            <a:r>
+              <a:rPr lang="es-ES" dirty="0"/>
+              <a:t>Para ver el tamaño de un </a:t>
+            </a:r>
+            <a:r>
+              <a:rPr lang="es-ES" b="1" dirty="0"/>
+              <a:t>array</a:t>
+            </a:r>
+            <a:r>
+              <a:rPr lang="es-ES" dirty="0"/>
+              <a:t>:</a:t>
+            </a:r>
+          </a:p>
+          <a:p>
+            <a:pPr marL="457200" lvl="1" indent="0">
+              <a:buNone/>
+            </a:pPr>
+            <a:r>
+              <a:rPr lang="es-ES" i="1" dirty="0"/>
+              <a:t>&lt;nombre array&gt;.</a:t>
+            </a:r>
+            <a:r>
+              <a:rPr lang="es-ES" i="1" dirty="0" err="1"/>
+              <a:t>Length</a:t>
+            </a:r>
+            <a:endParaRPr lang="es-ES" i="1" dirty="0"/>
+          </a:p>
+          <a:p>
+            <a:pPr marL="457200" lvl="1" indent="0">
+              <a:buNone/>
+            </a:pPr>
+            <a:endParaRPr lang="es-ES" i="1" dirty="0"/>
+          </a:p>
+        </p:txBody>
+      </p:sp>
+    </p:spTree>
+    <p:extLst>
+      <p:ext uri="{BB962C8B-B14F-4D97-AF65-F5344CB8AC3E}">
+        <p14:creationId xmlns:p14="http://schemas.microsoft.com/office/powerpoint/2010/main" val="3824265331"/>
+      </p:ext>
+    </p:extLst>
+  </p:cSld>
+  <p:clrMapOvr>
+    <a:masterClrMapping/>
+  </p:clrMapOvr>
+</p:sld>
+</file>
+
+<file path=ppt/slides/slide27.xml><?xml version="1.0" encoding="utf-8"?>
+<p:sld xmlns:a="http://schemas.openxmlformats.org/drawingml/2006/main" xmlns:r="http://schemas.openxmlformats.org/officeDocument/2006/relationships" xmlns:p="http://schemas.openxmlformats.org/presentationml/2006/main">
+  <p:cSld>
+    <p:spTree>
+      <p:nvGrpSpPr>
+        <p:cNvPr id="1" name=""/>
+        <p:cNvGrpSpPr/>
+        <p:nvPr/>
+      </p:nvGrpSpPr>
+      <p:grpSpPr>
+        <a:xfrm>
+          <a:off x="0" y="0"/>
+          <a:ext cx="0" cy="0"/>
+          <a:chOff x="0" y="0"/>
+          <a:chExt cx="0" cy="0"/>
+        </a:xfrm>
+      </p:grpSpPr>
+      <p:sp>
+        <p:nvSpPr>
+          <p:cNvPr id="2" name="Título 1">
+            <a:extLst>
+              <a:ext uri="{FF2B5EF4-FFF2-40B4-BE49-F238E27FC236}">
+                <a16:creationId xmlns:a16="http://schemas.microsoft.com/office/drawing/2014/main" id="{C8D33E10-5722-4397-8042-B9925A6A93E1}"/>
+              </a:ext>
+            </a:extLst>
+          </p:cNvPr>
+          <p:cNvSpPr>
+            <a:spLocks noGrp="1"/>
+          </p:cNvSpPr>
+          <p:nvPr>
+            <p:ph type="title"/>
+          </p:nvPr>
+        </p:nvSpPr>
+        <p:spPr/>
+        <p:txBody>
+          <a:bodyPr/>
+          <a:lstStyle/>
+          <a:p>
+            <a:r>
+              <a:rPr lang="es-ES" b="1" dirty="0" err="1"/>
+              <a:t>Arrays</a:t>
+            </a:r>
+            <a:r>
+              <a:rPr lang="es-ES" b="1" dirty="0"/>
+              <a:t> multidimensionales I (</a:t>
+            </a:r>
+            <a:r>
+              <a:rPr lang="es-ES" dirty="0"/>
+              <a:t>28 y 29)</a:t>
+            </a:r>
+          </a:p>
+        </p:txBody>
+      </p:sp>
+      <p:sp>
+        <p:nvSpPr>
+          <p:cNvPr id="3" name="Marcador de contenido 2">
+            <a:extLst>
+              <a:ext uri="{FF2B5EF4-FFF2-40B4-BE49-F238E27FC236}">
+                <a16:creationId xmlns:a16="http://schemas.microsoft.com/office/drawing/2014/main" id="{9BC1ADC9-D515-4196-B953-F3BEDAA2B865}"/>
+              </a:ext>
+            </a:extLst>
+          </p:cNvPr>
+          <p:cNvSpPr>
+            <a:spLocks noGrp="1"/>
+          </p:cNvSpPr>
+          <p:nvPr>
+            <p:ph idx="1"/>
+          </p:nvPr>
+        </p:nvSpPr>
+        <p:spPr/>
+        <p:txBody>
+          <a:bodyPr/>
+          <a:lstStyle/>
+          <a:p>
+            <a:r>
+              <a:rPr lang="es-ES" dirty="0"/>
+              <a:t>Se declaran así:</a:t>
+            </a:r>
+          </a:p>
+          <a:p>
+            <a:pPr marL="457200" lvl="1" indent="0">
+              <a:buNone/>
+            </a:pPr>
+            <a:r>
+              <a:rPr lang="es-ES" i="1" dirty="0"/>
+              <a:t>&lt;tipo de dato&gt;[,] &lt;nombre del array&gt; = new &lt;mismo tipo de dato&gt; [&lt;</a:t>
+            </a:r>
+            <a:r>
+              <a:rPr lang="es-ES" i="1" dirty="0" err="1"/>
+              <a:t>nº</a:t>
+            </a:r>
+            <a:r>
+              <a:rPr lang="es-ES" i="1" dirty="0"/>
+              <a:t> de filas&gt;, &lt;</a:t>
+            </a:r>
+            <a:r>
+              <a:rPr lang="es-ES" i="1" dirty="0" err="1"/>
+              <a:t>nº</a:t>
+            </a:r>
+            <a:r>
+              <a:rPr lang="es-ES" i="1" dirty="0"/>
+              <a:t> de columnas&gt;];</a:t>
+            </a:r>
+          </a:p>
+          <a:p>
+            <a:r>
+              <a:rPr lang="es-ES" dirty="0"/>
+              <a:t>En los </a:t>
+            </a:r>
+            <a:r>
+              <a:rPr lang="es-ES" b="1" dirty="0" err="1"/>
+              <a:t>arrays</a:t>
+            </a:r>
+            <a:r>
+              <a:rPr lang="es-ES" b="1" dirty="0"/>
+              <a:t> multidimensionales</a:t>
+            </a:r>
+            <a:r>
+              <a:rPr lang="es-ES" dirty="0"/>
+              <a:t> los valores se dan así:</a:t>
+            </a:r>
+          </a:p>
+          <a:p>
+            <a:pPr marL="457200" lvl="1" indent="0">
+              <a:buNone/>
+            </a:pPr>
+            <a:r>
+              <a:rPr lang="es-ES" i="1" dirty="0"/>
+              <a:t>&lt;nombre del array&gt;[&lt;fila&gt;, &lt;columna&gt;] = &lt;valor&gt;;</a:t>
+            </a:r>
+          </a:p>
+          <a:p>
+            <a:r>
+              <a:rPr lang="es-ES" dirty="0"/>
+              <a:t>Los valores se obtienen de la siguiente forma:</a:t>
+            </a:r>
+          </a:p>
+          <a:p>
+            <a:pPr marL="457200" lvl="1" indent="0">
+              <a:buNone/>
+            </a:pPr>
+            <a:r>
+              <a:rPr lang="es-ES" i="1" dirty="0"/>
+              <a:t>&lt;nombre del array&gt; [&lt;fila&gt;, &lt;columna&gt;] </a:t>
+            </a:r>
+          </a:p>
+          <a:p>
+            <a:r>
+              <a:rPr lang="es-ES" dirty="0"/>
+              <a:t>En estos </a:t>
+            </a:r>
+            <a:r>
+              <a:rPr lang="es-ES" b="1" dirty="0" err="1"/>
+              <a:t>arrays</a:t>
+            </a:r>
+            <a:r>
+              <a:rPr lang="es-ES" dirty="0"/>
+              <a:t> la propiedad </a:t>
+            </a:r>
+            <a:r>
+              <a:rPr lang="es-ES" b="1" dirty="0" err="1"/>
+              <a:t>Length</a:t>
+            </a:r>
+            <a:r>
+              <a:rPr lang="es-ES" dirty="0"/>
+              <a:t> da como resultado el producto de sus dimensiones. Por ejemplo:</a:t>
+            </a:r>
+          </a:p>
+          <a:p>
+            <a:pPr marL="457200" lvl="1" indent="0">
+              <a:buNone/>
+            </a:pPr>
+            <a:r>
+              <a:rPr lang="es-ES" dirty="0"/>
+              <a:t>En Matriz[5,3], su longitud es de 15: 5 X 3.</a:t>
+            </a:r>
+          </a:p>
+          <a:p>
+            <a:endParaRPr lang="es-ES" i="1" dirty="0"/>
+          </a:p>
+        </p:txBody>
+      </p:sp>
+      <p:sp>
+        <p:nvSpPr>
+          <p:cNvPr id="4" name="Flecha: a la derecha 3">
+            <a:extLst>
+              <a:ext uri="{FF2B5EF4-FFF2-40B4-BE49-F238E27FC236}">
+                <a16:creationId xmlns:a16="http://schemas.microsoft.com/office/drawing/2014/main" id="{E68B02DB-8B60-47D9-AFBC-57916A719DCA}"/>
+              </a:ext>
+            </a:extLst>
+          </p:cNvPr>
+          <p:cNvSpPr/>
+          <p:nvPr/>
+        </p:nvSpPr>
+        <p:spPr>
+          <a:xfrm>
+            <a:off x="10375392" y="5692331"/>
+            <a:ext cx="978408" cy="484632"/>
+          </a:xfrm>
+          <a:prstGeom prst="rightArrow">
+            <a:avLst/>
+          </a:prstGeom>
+        </p:spPr>
+        <p:style>
+          <a:lnRef idx="2">
+            <a:schemeClr val="accent1">
+              <a:shade val="50000"/>
+            </a:schemeClr>
+          </a:lnRef>
+          <a:fillRef idx="1">
+            <a:schemeClr val="accent1"/>
+          </a:fillRef>
+          <a:effectRef idx="0">
+            <a:schemeClr val="accent1"/>
+          </a:effectRef>
+          <a:fontRef idx="minor">
+            <a:schemeClr val="lt1"/>
+          </a:fontRef>
+        </p:style>
+        <p:txBody>
+          <a:bodyPr rtlCol="0" anchor="ctr"/>
+          <a:lstStyle/>
+          <a:p>
+            <a:pPr algn="ctr"/>
+            <a:endParaRPr lang="es-ES"/>
+          </a:p>
+        </p:txBody>
+      </p:sp>
+    </p:spTree>
+    <p:extLst>
+      <p:ext uri="{BB962C8B-B14F-4D97-AF65-F5344CB8AC3E}">
+        <p14:creationId xmlns:p14="http://schemas.microsoft.com/office/powerpoint/2010/main" val="2502034161"/>
+      </p:ext>
+    </p:extLst>
+  </p:cSld>
+  <p:clrMapOvr>
+    <a:masterClrMapping/>
+  </p:clrMapOvr>
+</p:sld>
+</file>
+
+<file path=ppt/slides/slide28.xml><?xml version="1.0" encoding="utf-8"?>
+<p:sld xmlns:a="http://schemas.openxmlformats.org/drawingml/2006/main" xmlns:r="http://schemas.openxmlformats.org/officeDocument/2006/relationships" xmlns:p="http://schemas.openxmlformats.org/presentationml/2006/main">
+  <p:cSld>
+    <p:spTree>
+      <p:nvGrpSpPr>
+        <p:cNvPr id="1" name=""/>
+        <p:cNvGrpSpPr/>
+        <p:nvPr/>
+      </p:nvGrpSpPr>
+      <p:grpSpPr>
+        <a:xfrm>
+          <a:off x="0" y="0"/>
+          <a:ext cx="0" cy="0"/>
+          <a:chOff x="0" y="0"/>
+          <a:chExt cx="0" cy="0"/>
+        </a:xfrm>
+      </p:grpSpPr>
+      <p:sp>
+        <p:nvSpPr>
+          <p:cNvPr id="2" name="Título 1">
+            <a:extLst>
+              <a:ext uri="{FF2B5EF4-FFF2-40B4-BE49-F238E27FC236}">
+                <a16:creationId xmlns:a16="http://schemas.microsoft.com/office/drawing/2014/main" id="{20DFD2B9-9A43-49EE-A273-06FBFF462C3B}"/>
+              </a:ext>
+            </a:extLst>
+          </p:cNvPr>
+          <p:cNvSpPr>
+            <a:spLocks noGrp="1"/>
+          </p:cNvSpPr>
+          <p:nvPr>
+            <p:ph type="title"/>
+          </p:nvPr>
+        </p:nvSpPr>
+        <p:spPr/>
+        <p:txBody>
+          <a:bodyPr/>
+          <a:lstStyle/>
+          <a:p>
+            <a:r>
+              <a:rPr lang="es-ES" b="1" dirty="0" err="1"/>
+              <a:t>Arrays</a:t>
+            </a:r>
+            <a:r>
+              <a:rPr lang="es-ES" b="1" dirty="0"/>
+              <a:t> multidimensionales II (</a:t>
+            </a:r>
+            <a:r>
+              <a:rPr lang="es-ES" dirty="0"/>
+              <a:t>28 y 29)</a:t>
+            </a:r>
+          </a:p>
+        </p:txBody>
+      </p:sp>
+      <p:sp>
+        <p:nvSpPr>
+          <p:cNvPr id="3" name="Marcador de contenido 2">
+            <a:extLst>
+              <a:ext uri="{FF2B5EF4-FFF2-40B4-BE49-F238E27FC236}">
+                <a16:creationId xmlns:a16="http://schemas.microsoft.com/office/drawing/2014/main" id="{C464BB34-B4BF-4A4B-8AE0-C6A51110E77F}"/>
+              </a:ext>
+            </a:extLst>
+          </p:cNvPr>
+          <p:cNvSpPr>
+            <a:spLocks noGrp="1"/>
+          </p:cNvSpPr>
+          <p:nvPr>
+            <p:ph idx="1"/>
+          </p:nvPr>
+        </p:nvSpPr>
+        <p:spPr/>
+        <p:txBody>
+          <a:bodyPr/>
+          <a:lstStyle/>
+          <a:p>
+            <a:r>
+              <a:rPr lang="es-ES" dirty="0"/>
+              <a:t>Para saber el número de filas y columnas se usa la propiedad </a:t>
+            </a:r>
+            <a:r>
+              <a:rPr lang="es-ES" b="1" dirty="0" err="1"/>
+              <a:t>GetLength</a:t>
+            </a:r>
+            <a:r>
+              <a:rPr lang="es-ES" b="1" dirty="0"/>
+              <a:t>(&lt;parámetro)</a:t>
+            </a:r>
+            <a:r>
+              <a:rPr lang="es-ES" dirty="0"/>
+              <a:t>. Si lo que queremos saber es el número de filas, el parámetro es 0; y es 1 si queremos saber el número </a:t>
+            </a:r>
+            <a:r>
+              <a:rPr lang="es-ES"/>
+              <a:t>de columnas.  </a:t>
+            </a:r>
+            <a:endParaRPr lang="es-ES" dirty="0"/>
+          </a:p>
+        </p:txBody>
+      </p:sp>
+    </p:spTree>
+    <p:extLst>
+      <p:ext uri="{BB962C8B-B14F-4D97-AF65-F5344CB8AC3E}">
+        <p14:creationId xmlns:p14="http://schemas.microsoft.com/office/powerpoint/2010/main" val="2572156248"/>
       </p:ext>
     </p:extLst>
   </p:cSld>
@@ -3704,7 +7326,7 @@
           <a:p>
             <a:r>
               <a:rPr lang="es-ES" dirty="0"/>
-              <a:t>Definición de variables I (Vídeos 4, 5, 8 y 9)</a:t>
+              <a:t>Definición de variables I (Vídeos 4, 5, 8, 9 y 14)</a:t>
             </a:r>
           </a:p>
         </p:txBody>
@@ -3927,7 +7549,7 @@
           <a:p>
             <a:r>
               <a:rPr lang="es-ES" dirty="0"/>
-              <a:t>Definición de variables II (Vídeos 4, 5, 8 y 9)</a:t>
+              <a:t>Definición de variables II (Vídeos 4, 5, 8, 9 y 14)</a:t>
             </a:r>
           </a:p>
         </p:txBody>
@@ -3969,8 +7591,9 @@
             </a:r>
             <a:r>
               <a:rPr lang="es-ES" dirty="0"/>
-              <a:t>: Cadena de caracteres.</a:t>
-            </a:r>
+              <a:t>: Cadena de caracteres. </a:t>
+            </a:r>
+            <a:endParaRPr lang="es-ES" i="1" dirty="0"/>
           </a:p>
           <a:p>
             <a:pPr lvl="1">
@@ -4046,35 +7669,6 @@
             <a:r>
               <a:rPr lang="es-ES" b="1" dirty="0" err="1"/>
               <a:t>double</a:t>
-            </a:r>
-            <a:r>
-              <a:rPr lang="es-ES" dirty="0"/>
-              <a:t>.</a:t>
-            </a:r>
-          </a:p>
-          <a:p>
-            <a:pPr lvl="1">
-              <a:buFont typeface="Wingdings" panose="05000000000000000000" pitchFamily="2" charset="2"/>
-              <a:buChar char="§"/>
-            </a:pPr>
-            <a:r>
-              <a:rPr lang="es-ES" b="1" dirty="0" err="1"/>
-              <a:t>double</a:t>
-            </a:r>
-            <a:r>
-              <a:rPr lang="es-ES" dirty="0"/>
-              <a:t>: Número con decimales.</a:t>
-            </a:r>
-          </a:p>
-          <a:p>
-            <a:pPr lvl="2"/>
-            <a:r>
-              <a:rPr lang="es-ES" dirty="0"/>
-              <a:t>Acepta números y decimales más grandes que el </a:t>
-            </a:r>
-            <a:r>
-              <a:rPr lang="es-ES" b="1" dirty="0" err="1"/>
-              <a:t>float</a:t>
             </a:r>
             <a:r>
               <a:rPr lang="es-ES" dirty="0"/>
@@ -4189,7 +7783,7 @@
           <a:p>
             <a:r>
               <a:rPr lang="es-ES" dirty="0"/>
-              <a:t>Definición de variables III (Vídeos 4, 5, 8 y 9)</a:t>
+              <a:t>Definición de variables III (Vídeos 4, 5, 8, 9 y 14)</a:t>
             </a:r>
           </a:p>
         </p:txBody>
@@ -4212,7 +7806,9 @@
         </p:nvSpPr>
         <p:spPr/>
         <p:txBody>
-          <a:bodyPr/>
+          <a:bodyPr>
+            <a:normAutofit/>
+          </a:bodyPr>
           <a:lstStyle/>
           <a:p>
             <a:pPr lvl="1">
@@ -4221,11 +7817,11 @@
             </a:pPr>
             <a:r>
               <a:rPr lang="es-ES" b="1" dirty="0"/>
-              <a:t>decimal: </a:t>
-            </a:r>
-            <a:r>
-              <a:rPr lang="es-ES" dirty="0"/>
-              <a:t>Números decimales.</a:t>
+              <a:t>double</a:t>
+            </a:r>
+            <a:r>
+              <a:rPr lang="es-ES" dirty="0"/>
+              <a:t>: Número con decimales.</a:t>
             </a:r>
           </a:p>
           <a:p>
@@ -4236,12 +7832,13 @@
             </a:r>
             <a:r>
               <a:rPr lang="es-ES" b="1" dirty="0" err="1"/>
-              <a:t>double</a:t>
+              <a:t>float</a:t>
             </a:r>
             <a:r>
               <a:rPr lang="es-ES" dirty="0"/>
               <a:t>.</a:t>
             </a:r>
+            <a:endParaRPr lang="es-ES" b="1" dirty="0"/>
           </a:p>
           <a:p>
             <a:pPr lvl="1">
@@ -4250,22 +7847,26 @@
             </a:pPr>
             <a:r>
               <a:rPr lang="es-ES" b="1" dirty="0"/>
-              <a:t>byte</a:t>
-            </a:r>
-            <a:r>
-              <a:rPr lang="es-ES" sz="2800" dirty="0"/>
-              <a:t>: </a:t>
-            </a:r>
-            <a:r>
-              <a:rPr lang="es-ES" dirty="0"/>
-              <a:t>Número muy pequeños.</a:t>
+              <a:t>decimal: </a:t>
+            </a:r>
+            <a:r>
+              <a:rPr lang="es-ES" dirty="0"/>
+              <a:t>Números decimales.</a:t>
             </a:r>
           </a:p>
           <a:p>
             <a:pPr lvl="2"/>
             <a:r>
               <a:rPr lang="es-ES" dirty="0"/>
-              <a:t>Su valor máximo es 255.</a:t>
+              <a:t>Acepta números y decimales más grandes que el </a:t>
+            </a:r>
+            <a:r>
+              <a:rPr lang="es-ES" b="1" dirty="0" err="1"/>
+              <a:t>double</a:t>
+            </a:r>
+            <a:r>
+              <a:rPr lang="es-ES" dirty="0"/>
+              <a:t>.</a:t>
             </a:r>
           </a:p>
           <a:p>
@@ -4274,28 +7875,23 @@
               <a:buChar char="§"/>
             </a:pPr>
             <a:r>
-              <a:rPr lang="es-ES" b="1" dirty="0" err="1"/>
-              <a:t>bool</a:t>
-            </a:r>
-            <a:r>
-              <a:rPr lang="es-ES" dirty="0"/>
-              <a:t>: Sólo admite </a:t>
-            </a:r>
-            <a:r>
               <a:rPr lang="es-ES" b="1" dirty="0"/>
-              <a:t>true</a:t>
-            </a:r>
-            <a:r>
-              <a:rPr lang="es-ES" dirty="0"/>
-              <a:t> o </a:t>
-            </a:r>
-            <a:r>
-              <a:rPr lang="es-ES" b="1" dirty="0"/>
-              <a:t>false</a:t>
-            </a:r>
-            <a:r>
-              <a:rPr lang="es-ES" dirty="0"/>
-              <a:t>.</a:t>
+              <a:t>byte</a:t>
+            </a:r>
+            <a:r>
+              <a:rPr lang="es-ES" sz="2800" dirty="0"/>
+              <a:t>: </a:t>
+            </a:r>
+            <a:r>
+              <a:rPr lang="es-ES" dirty="0"/>
+              <a:t>Número muy pequeños.</a:t>
+            </a:r>
+          </a:p>
+          <a:p>
+            <a:pPr lvl="2"/>
+            <a:r>
+              <a:rPr lang="es-ES" dirty="0"/>
+              <a:t>Su valor máximo es 255.</a:t>
             </a:r>
           </a:p>
           <a:p>
@@ -4305,84 +7901,87 @@
             </a:pPr>
             <a:r>
               <a:rPr lang="es-ES" b="1" dirty="0" err="1"/>
-              <a:t>DateTime</a:t>
-            </a:r>
-            <a:r>
-              <a:rPr lang="es-ES" dirty="0"/>
-              <a:t>: Guarda fechas.</a:t>
-            </a:r>
+              <a:t>bool</a:t>
+            </a:r>
+            <a:r>
+              <a:rPr lang="es-ES" dirty="0"/>
+              <a:t>: Sólo admite </a:t>
+            </a:r>
+            <a:r>
+              <a:rPr lang="es-ES" b="1" dirty="0"/>
+              <a:t>true</a:t>
+            </a:r>
+            <a:r>
+              <a:rPr lang="es-ES" dirty="0"/>
+              <a:t> o </a:t>
+            </a:r>
+            <a:r>
+              <a:rPr lang="es-ES" b="1" dirty="0"/>
+              <a:t>false</a:t>
+            </a:r>
+            <a:r>
+              <a:rPr lang="es-ES" dirty="0"/>
+              <a:t>.</a:t>
+            </a:r>
+          </a:p>
+          <a:p>
+            <a:pPr marL="457200" lvl="1" indent="0">
+              <a:buNone/>
+            </a:pPr>
+            <a:endParaRPr lang="es-ES" sz="2400" dirty="0"/>
           </a:p>
           <a:p>
             <a:pPr lvl="2">
               <a:buFont typeface="Wingdings" panose="05000000000000000000" pitchFamily="2" charset="2"/>
               <a:buChar char="§"/>
             </a:pPr>
-            <a:r>
-              <a:rPr lang="es-ES" dirty="0"/>
-              <a:t>Ejemplo de dar un valor a este tipo de dar valores:</a:t>
-            </a:r>
-          </a:p>
-          <a:p>
-            <a:pPr marL="914400" lvl="2" indent="0">
-              <a:buNone/>
-            </a:pPr>
-            <a:r>
-              <a:rPr lang="es-ES" sz="2400" dirty="0"/>
-              <a:t>	</a:t>
-            </a:r>
-            <a:r>
-              <a:rPr lang="es-ES" sz="1800" i="1" dirty="0" err="1"/>
-              <a:t>DateTime</a:t>
-            </a:r>
-            <a:r>
-              <a:rPr lang="es-ES" sz="1800" i="1" dirty="0"/>
-              <a:t> fecha = </a:t>
-            </a:r>
-            <a:r>
-              <a:rPr lang="es-ES" sz="1800" i="1" dirty="0" err="1"/>
-              <a:t>DateTime.Today</a:t>
-            </a:r>
-            <a:r>
-              <a:rPr lang="es-ES" sz="1800" i="1" dirty="0"/>
-              <a:t>;</a:t>
-            </a:r>
-          </a:p>
-          <a:p>
-            <a:pPr lvl="2">
-              <a:buFont typeface="Wingdings" panose="05000000000000000000" pitchFamily="2" charset="2"/>
-              <a:buChar char="§"/>
-            </a:pPr>
-            <a:r>
-              <a:rPr lang="es-ES" dirty="0"/>
-              <a:t>Tienen una serie de métodos a los que se accede así:</a:t>
-            </a:r>
-          </a:p>
-          <a:p>
-            <a:pPr marL="914400" lvl="2" indent="0">
-              <a:buNone/>
-            </a:pPr>
-            <a:r>
-              <a:rPr lang="es-ES" sz="2400" i="1" dirty="0"/>
-              <a:t>	</a:t>
-            </a:r>
-            <a:r>
-              <a:rPr lang="es-ES" sz="1800" i="1" dirty="0"/>
-              <a:t>&lt;nombre de variable&gt;.&lt;método&gt;</a:t>
-            </a:r>
-            <a:endParaRPr lang="es-ES" sz="1800" dirty="0"/>
-          </a:p>
-          <a:p>
-            <a:pPr marL="457200" lvl="1" indent="0">
-              <a:buNone/>
-            </a:pPr>
-            <a:endParaRPr lang="es-ES" sz="2400" dirty="0"/>
-          </a:p>
-          <a:p>
-            <a:pPr lvl="2">
-              <a:buFont typeface="Wingdings" panose="05000000000000000000" pitchFamily="2" charset="2"/>
-              <a:buChar char="§"/>
-            </a:pPr>
             <a:endParaRPr lang="es-ES" b="1" dirty="0"/>
+          </a:p>
+        </p:txBody>
+      </p:sp>
+      <p:sp>
+        <p:nvSpPr>
+          <p:cNvPr id="4" name="Flecha: a la derecha 3">
+            <a:extLst>
+              <a:ext uri="{FF2B5EF4-FFF2-40B4-BE49-F238E27FC236}">
+                <a16:creationId xmlns:a16="http://schemas.microsoft.com/office/drawing/2014/main" id="{06AE2D24-8B0B-4D23-A563-C9BDF6A5BB77}"/>
+              </a:ext>
+            </a:extLst>
+          </p:cNvPr>
+          <p:cNvSpPr/>
+          <p:nvPr/>
+        </p:nvSpPr>
+        <p:spPr>
+          <a:xfrm>
+            <a:off x="10375392" y="5692331"/>
+            <a:ext cx="978408" cy="484632"/>
+          </a:xfrm>
+          <a:prstGeom prst="rightArrow">
+            <a:avLst/>
+          </a:prstGeom>
+        </p:spPr>
+        <p:style>
+          <a:lnRef idx="2">
+            <a:schemeClr val="accent1">
+              <a:shade val="50000"/>
+            </a:schemeClr>
+          </a:lnRef>
+          <a:fillRef idx="1">
+            <a:schemeClr val="accent1"/>
+          </a:fillRef>
+          <a:effectRef idx="0">
+            <a:schemeClr val="accent1"/>
+          </a:effectRef>
+          <a:fontRef idx="minor">
+            <a:schemeClr val="lt1"/>
+          </a:fontRef>
+        </p:style>
+        <p:txBody>
+          <a:bodyPr rtlCol="0" anchor="ctr"/>
+          <a:lstStyle/>
+          <a:p>
+            <a:pPr algn="ctr"/>
+            <a:endParaRPr lang="es-ES"/>
           </a:p>
         </p:txBody>
       </p:sp>
@@ -4439,7 +8038,7 @@
           <a:p>
             <a:r>
               <a:rPr lang="es-ES" dirty="0"/>
-              <a:t>Definición de variables IV (Vídeos 4, 5, 8 y 9)</a:t>
+              <a:t>Definición de variables IV (Vídeos 4, 5, 8, 9 y 14)</a:t>
             </a:r>
           </a:p>
         </p:txBody>
@@ -4464,6 +8063,79 @@
         <p:txBody>
           <a:bodyPr/>
           <a:lstStyle/>
+          <a:p>
+            <a:pPr lvl="1">
+              <a:buFont typeface="Wingdings" panose="05000000000000000000" pitchFamily="2" charset="2"/>
+              <a:buChar char="§"/>
+            </a:pPr>
+            <a:r>
+              <a:rPr lang="es-ES" b="1" dirty="0" err="1"/>
+              <a:t>DateTime</a:t>
+            </a:r>
+            <a:r>
+              <a:rPr lang="es-ES" dirty="0"/>
+              <a:t>: Guarda fechas.</a:t>
+            </a:r>
+          </a:p>
+          <a:p>
+            <a:pPr lvl="2">
+              <a:buFont typeface="Wingdings" panose="05000000000000000000" pitchFamily="2" charset="2"/>
+              <a:buChar char="§"/>
+            </a:pPr>
+            <a:r>
+              <a:rPr lang="es-ES" dirty="0"/>
+              <a:t>Ejemplo de dar un valor a este tipo de dar valores:</a:t>
+            </a:r>
+          </a:p>
+          <a:p>
+            <a:pPr marL="914400" lvl="2" indent="0">
+              <a:buNone/>
+            </a:pPr>
+            <a:r>
+              <a:rPr lang="es-ES" sz="2400" dirty="0"/>
+              <a:t>	</a:t>
+            </a:r>
+            <a:r>
+              <a:rPr lang="es-ES" sz="1800" i="1" dirty="0" err="1"/>
+              <a:t>DateTime</a:t>
+            </a:r>
+            <a:r>
+              <a:rPr lang="es-ES" sz="1800" i="1" dirty="0"/>
+              <a:t> fecha = </a:t>
+            </a:r>
+            <a:r>
+              <a:rPr lang="es-ES" sz="1800" i="1" dirty="0" err="1"/>
+              <a:t>DateTime.Today</a:t>
+            </a:r>
+            <a:r>
+              <a:rPr lang="es-ES" sz="1800" i="1" dirty="0"/>
+              <a:t>;</a:t>
+            </a:r>
+          </a:p>
+          <a:p>
+            <a:pPr lvl="2">
+              <a:buFont typeface="Wingdings" panose="05000000000000000000" pitchFamily="2" charset="2"/>
+              <a:buChar char="§"/>
+            </a:pPr>
+            <a:r>
+              <a:rPr lang="es-ES" dirty="0"/>
+              <a:t>Tienen una serie de métodos a los que se accede así:</a:t>
+            </a:r>
+          </a:p>
+          <a:p>
+            <a:pPr marL="914400" lvl="2" indent="0">
+              <a:buNone/>
+            </a:pPr>
+            <a:r>
+              <a:rPr lang="es-ES" sz="2400" i="1" dirty="0"/>
+              <a:t>	</a:t>
+            </a:r>
+            <a:r>
+              <a:rPr lang="es-ES" sz="1800" i="1" dirty="0"/>
+              <a:t>&lt;nombre de variable&gt;.&lt;método&gt;</a:t>
+            </a:r>
+            <a:endParaRPr lang="es-ES" dirty="0"/>
+          </a:p>
           <a:p>
             <a:pPr lvl="2">
               <a:buFont typeface="Wingdings" panose="05000000000000000000" pitchFamily="2" charset="2"/>
@@ -4563,7 +8235,7 @@
           <p:cNvPr id="2" name="Título 1">
             <a:extLst>
               <a:ext uri="{FF2B5EF4-FFF2-40B4-BE49-F238E27FC236}">
-                <a16:creationId xmlns:a16="http://schemas.microsoft.com/office/drawing/2014/main" id="{6BFFADDD-9AF8-49AB-8B56-3055F2DEB8FD}"/>
+                <a16:creationId xmlns:a16="http://schemas.microsoft.com/office/drawing/2014/main" id="{BCA05514-0226-4583-AE9F-E98DEDBD689C}"/>
               </a:ext>
             </a:extLst>
           </p:cNvPr>
@@ -4581,7 +8253,7 @@
           <a:p>
             <a:r>
               <a:rPr lang="es-ES" dirty="0"/>
-              <a:t>Mostrar mensaje (Vídeo 4)</a:t>
+              <a:t>Operaciones con variables I(Vídeo 21)</a:t>
             </a:r>
           </a:p>
         </p:txBody>
@@ -4591,7 +8263,7 @@
           <p:cNvPr id="3" name="Marcador de contenido 2">
             <a:extLst>
               <a:ext uri="{FF2B5EF4-FFF2-40B4-BE49-F238E27FC236}">
-                <a16:creationId xmlns:a16="http://schemas.microsoft.com/office/drawing/2014/main" id="{22D85BF1-9751-4857-A378-11B2BC55ACC1}"/>
+                <a16:creationId xmlns:a16="http://schemas.microsoft.com/office/drawing/2014/main" id="{2C68712D-B7A7-4FC3-AB9B-426C95518356}"/>
               </a:ext>
             </a:extLst>
           </p:cNvPr>
@@ -4604,67 +8276,205 @@
         </p:nvSpPr>
         <p:spPr/>
         <p:txBody>
-          <a:bodyPr/>
-          <a:lstStyle/>
-          <a:p>
-            <a:r>
-              <a:rPr lang="es-ES" dirty="0"/>
-              <a:t>Se usa el método </a:t>
+          <a:bodyPr>
+            <a:normAutofit fontScale="92500" lnSpcReduction="20000"/>
+          </a:bodyPr>
+          <a:lstStyle/>
+          <a:p>
+            <a:r>
+              <a:rPr lang="es-ES" dirty="0"/>
+              <a:t>Con cadenas de caracteres:</a:t>
+            </a:r>
+          </a:p>
+          <a:p>
+            <a:pPr lvl="1"/>
+            <a:r>
+              <a:rPr lang="es-ES" dirty="0"/>
+              <a:t>Unión de cadenas. Para unir dos cadenas de caracteres se usa el símbolo </a:t>
+            </a:r>
+            <a:r>
+              <a:rPr lang="es-ES" b="1" dirty="0"/>
+              <a:t>+</a:t>
+            </a:r>
+            <a:r>
+              <a:rPr lang="es-ES" dirty="0"/>
+              <a:t>:</a:t>
+            </a:r>
+          </a:p>
+          <a:p>
+            <a:pPr marL="914400" lvl="2" indent="0">
+              <a:buNone/>
+            </a:pPr>
+            <a:r>
+              <a:rPr lang="es-ES" i="1" dirty="0"/>
+              <a:t>&lt;cadena1&gt; + &lt;cadena2&gt;</a:t>
+            </a:r>
+          </a:p>
+          <a:p>
+            <a:pPr lvl="1"/>
+            <a:r>
+              <a:rPr lang="es-ES" dirty="0"/>
+              <a:t>Otra forma de unir cadenas es:</a:t>
+            </a:r>
+          </a:p>
+          <a:p>
+            <a:pPr marL="914400" lvl="2" indent="0">
+              <a:buNone/>
+            </a:pPr>
+            <a:r>
+              <a:rPr lang="es-ES" i="1" dirty="0"/>
+              <a:t>&lt;cadena1&gt; += &lt;valor&gt;</a:t>
+            </a:r>
+            <a:endParaRPr lang="es-ES" dirty="0"/>
+          </a:p>
+          <a:p>
+            <a:pPr marL="914400" lvl="2" indent="0">
+              <a:buNone/>
+            </a:pPr>
+            <a:r>
+              <a:rPr lang="es-ES" dirty="0"/>
+              <a:t>El valor da igual que sea un </a:t>
             </a:r>
             <a:r>
               <a:rPr lang="es-ES" b="1" dirty="0" err="1"/>
-              <a:t>MessageBox</a:t>
-            </a:r>
-            <a:r>
-              <a:rPr lang="es-ES" dirty="0"/>
-              <a:t>. Se puede llamar a este método de dos formas:</a:t>
+              <a:t>string</a:t>
+            </a:r>
+            <a:r>
+              <a:rPr lang="es-ES" dirty="0"/>
+              <a:t> o un número.</a:t>
+            </a:r>
+          </a:p>
+          <a:p>
+            <a:r>
+              <a:rPr lang="es-ES" dirty="0"/>
+              <a:t>Con números (aritméticas):</a:t>
             </a:r>
           </a:p>
           <a:p>
             <a:pPr lvl="1"/>
             <a:r>
-              <a:rPr lang="es-ES" b="1" dirty="0" err="1"/>
-              <a:t>Mbox</a:t>
-            </a:r>
-            <a:r>
-              <a:rPr lang="es-ES" dirty="0"/>
-              <a:t> y dos veces tabulador. Mostrará la estructura básica del método.</a:t>
+              <a:rPr lang="es-ES" b="1" dirty="0"/>
+              <a:t>+</a:t>
+            </a:r>
+            <a:r>
+              <a:rPr lang="es-ES" dirty="0"/>
+              <a:t>: Suma</a:t>
             </a:r>
           </a:p>
           <a:p>
             <a:pPr lvl="1"/>
             <a:r>
-              <a:rPr lang="es-ES" dirty="0"/>
-              <a:t>Escribir manualmente el método:</a:t>
-            </a:r>
-          </a:p>
-          <a:p>
-            <a:pPr marL="457200" lvl="1" indent="0">
-              <a:buNone/>
-            </a:pPr>
-            <a:r>
-              <a:rPr lang="es-ES" dirty="0"/>
-              <a:t>	</a:t>
-            </a:r>
-            <a:r>
-              <a:rPr lang="es-ES" sz="2000" i="1" dirty="0" err="1"/>
-              <a:t>MessageBox.Show</a:t>
-            </a:r>
-            <a:r>
-              <a:rPr lang="es-ES" sz="2000" i="1" dirty="0"/>
-              <a:t>(“&lt;mensaje&gt;”);</a:t>
+              <a:rPr lang="es-ES" b="1" dirty="0"/>
+              <a:t>-</a:t>
+            </a:r>
+            <a:r>
+              <a:rPr lang="es-ES" dirty="0"/>
+              <a:t>: Resta</a:t>
             </a:r>
           </a:p>
           <a:p>
             <a:pPr lvl="1"/>
+            <a:r>
+              <a:rPr lang="es-ES" b="1" dirty="0"/>
+              <a:t>*</a:t>
+            </a:r>
+            <a:r>
+              <a:rPr lang="es-ES" dirty="0"/>
+              <a:t>: Multiplicación</a:t>
+            </a:r>
+          </a:p>
+          <a:p>
+            <a:pPr lvl="1"/>
+            <a:r>
+              <a:rPr lang="es-ES" b="1" dirty="0"/>
+              <a:t>/</a:t>
+            </a:r>
+            <a:r>
+              <a:rPr lang="es-ES" dirty="0"/>
+              <a:t>: División</a:t>
+            </a:r>
+          </a:p>
+          <a:p>
+            <a:pPr lvl="1"/>
+            <a:r>
+              <a:rPr lang="es-ES" b="1" dirty="0"/>
+              <a:t>&lt;variable&gt;++</a:t>
+            </a:r>
+            <a:r>
+              <a:rPr lang="es-ES" dirty="0"/>
+              <a:t>: Suma 1 a la variable</a:t>
+            </a:r>
+          </a:p>
+          <a:p>
+            <a:pPr lvl="1"/>
+            <a:r>
+              <a:rPr lang="es-ES" b="1" dirty="0"/>
+              <a:t>&lt;variable&gt;--</a:t>
+            </a:r>
+            <a:r>
+              <a:rPr lang="es-ES" dirty="0"/>
+              <a:t>: Resta 1 a la variable</a:t>
+            </a:r>
             <a:endParaRPr lang="es-ES" b="1" dirty="0"/>
+          </a:p>
+          <a:p>
+            <a:pPr marL="914400" lvl="2" indent="0">
+              <a:buNone/>
+            </a:pPr>
+            <a:endParaRPr lang="es-ES" dirty="0"/>
+          </a:p>
+        </p:txBody>
+      </p:sp>
+      <p:sp>
+        <p:nvSpPr>
+          <p:cNvPr id="4" name="Flecha: a la derecha 3">
+            <a:extLst>
+              <a:ext uri="{FF2B5EF4-FFF2-40B4-BE49-F238E27FC236}">
+                <a16:creationId xmlns:a16="http://schemas.microsoft.com/office/drawing/2014/main" id="{8BF72200-BA9A-45D6-938F-71C573100878}"/>
+              </a:ext>
+            </a:extLst>
+          </p:cNvPr>
+          <p:cNvSpPr/>
+          <p:nvPr/>
+        </p:nvSpPr>
+        <p:spPr>
+          <a:xfrm>
+            <a:off x="10375392" y="5692331"/>
+            <a:ext cx="978408" cy="484632"/>
+          </a:xfrm>
+          <a:prstGeom prst="rightArrow">
+            <a:avLst/>
+          </a:prstGeom>
+        </p:spPr>
+        <p:style>
+          <a:lnRef idx="2">
+            <a:schemeClr val="accent1">
+              <a:shade val="50000"/>
+            </a:schemeClr>
+          </a:lnRef>
+          <a:fillRef idx="1">
+            <a:schemeClr val="accent1"/>
+          </a:fillRef>
+          <a:effectRef idx="0">
+            <a:schemeClr val="accent1"/>
+          </a:effectRef>
+          <a:fontRef idx="minor">
+            <a:schemeClr val="lt1"/>
+          </a:fontRef>
+        </p:style>
+        <p:txBody>
+          <a:bodyPr rtlCol="0" anchor="ctr"/>
+          <a:lstStyle/>
+          <a:p>
+            <a:pPr algn="ctr"/>
+            <a:endParaRPr lang="es-ES"/>
           </a:p>
         </p:txBody>
       </p:sp>
     </p:spTree>
     <p:extLst>
       <p:ext uri="{BB962C8B-B14F-4D97-AF65-F5344CB8AC3E}">
-        <p14:creationId xmlns:p14="http://schemas.microsoft.com/office/powerpoint/2010/main" val="617340827"/>
+        <p14:creationId xmlns:p14="http://schemas.microsoft.com/office/powerpoint/2010/main" val="200103267"/>
       </p:ext>
     </p:extLst>
   </p:cSld>
@@ -4696,7 +8506,7 @@
           <p:cNvPr id="2" name="Título 1">
             <a:extLst>
               <a:ext uri="{FF2B5EF4-FFF2-40B4-BE49-F238E27FC236}">
-                <a16:creationId xmlns:a16="http://schemas.microsoft.com/office/drawing/2014/main" id="{3CB263F5-9B46-4C95-B7C7-D81031CAD697}"/>
+                <a16:creationId xmlns:a16="http://schemas.microsoft.com/office/drawing/2014/main" id="{5ADBDD6B-FD71-467F-95C9-F8EB2AC06396}"/>
               </a:ext>
             </a:extLst>
           </p:cNvPr>
@@ -4714,7 +8524,7 @@
           <a:p>
             <a:r>
               <a:rPr lang="es-ES" dirty="0"/>
-              <a:t>Conversiones (Vídeo 6, 7 y 8)</a:t>
+              <a:t>Operaciones con variables I(Vídeo 21)</a:t>
             </a:r>
           </a:p>
         </p:txBody>
@@ -4724,7 +8534,7 @@
           <p:cNvPr id="3" name="Marcador de contenido 2">
             <a:extLst>
               <a:ext uri="{FF2B5EF4-FFF2-40B4-BE49-F238E27FC236}">
-                <a16:creationId xmlns:a16="http://schemas.microsoft.com/office/drawing/2014/main" id="{C46822C3-84A6-4AA0-AC3F-0A1AD9C172F6}"/>
+                <a16:creationId xmlns:a16="http://schemas.microsoft.com/office/drawing/2014/main" id="{6C1024AA-E5A0-4FEC-ADA5-11C647EEC2C4}"/>
               </a:ext>
             </a:extLst>
           </p:cNvPr>
@@ -4740,138 +8550,52 @@
           <a:bodyPr/>
           <a:lstStyle/>
           <a:p>
-            <a:r>
-              <a:rPr lang="es-ES" dirty="0"/>
-              <a:t>Convierte una variable de tipo </a:t>
-            </a:r>
+            <a:pPr lvl="1"/>
             <a:r>
               <a:rPr lang="es-ES" b="1" dirty="0"/>
-              <a:t>número</a:t>
-            </a:r>
-            <a:r>
-              <a:rPr lang="es-ES" dirty="0"/>
-              <a:t> a </a:t>
+              <a:t>&lt;variable&gt; += &lt;cantidad&gt;</a:t>
+            </a:r>
+            <a:r>
+              <a:rPr lang="es-ES" dirty="0"/>
+              <a:t>: Suma la cantidad a la variable</a:t>
+            </a:r>
+          </a:p>
+          <a:p>
+            <a:pPr lvl="1"/>
+            <a:r>
+              <a:rPr lang="es-ES" b="1" dirty="0"/>
+              <a:t>&lt;variable&gt; -= &lt;cantidad&gt;</a:t>
+            </a:r>
+            <a:r>
+              <a:rPr lang="es-ES" dirty="0"/>
+              <a:t>: Resta la cantidad a la variable</a:t>
+            </a:r>
+          </a:p>
+          <a:p>
+            <a:pPr lvl="1"/>
+            <a:r>
+              <a:rPr lang="es-ES" dirty="0"/>
+              <a:t>Existen más operaciones usando la función </a:t>
             </a:r>
             <a:r>
               <a:rPr lang="es-ES" b="1" dirty="0" err="1"/>
-              <a:t>string</a:t>
-            </a:r>
-            <a:r>
-              <a:rPr lang="es-ES" dirty="0"/>
-              <a:t>:</a:t>
-            </a:r>
-          </a:p>
-          <a:p>
-            <a:pPr marL="457200" lvl="1" indent="0">
-              <a:buNone/>
-            </a:pPr>
-            <a:r>
-              <a:rPr lang="es-ES" i="1" dirty="0"/>
-              <a:t>&lt;nombre de variable&gt;.</a:t>
-            </a:r>
-            <a:r>
-              <a:rPr lang="es-ES" i="1" dirty="0" err="1"/>
-              <a:t>ToString</a:t>
-            </a:r>
-            <a:r>
-              <a:rPr lang="es-ES" i="1" dirty="0"/>
-              <a:t>();</a:t>
-            </a:r>
-          </a:p>
-          <a:p>
-            <a:r>
-              <a:rPr lang="es-ES" dirty="0"/>
-              <a:t>Convierte una variable de tipo </a:t>
-            </a:r>
-            <a:r>
-              <a:rPr lang="es-ES" b="1" dirty="0" err="1"/>
-              <a:t>bool</a:t>
-            </a:r>
-            <a:r>
-              <a:rPr lang="es-ES" dirty="0"/>
-              <a:t> a </a:t>
-            </a:r>
-            <a:r>
-              <a:rPr lang="es-ES" b="1" dirty="0" err="1"/>
-              <a:t>string</a:t>
-            </a:r>
-            <a:r>
-              <a:rPr lang="es-ES" dirty="0"/>
-              <a:t>:</a:t>
-            </a:r>
-          </a:p>
-          <a:p>
-            <a:pPr marL="457200" lvl="1" indent="0">
-              <a:buNone/>
-            </a:pPr>
-            <a:r>
-              <a:rPr lang="es-ES" i="1" dirty="0"/>
-              <a:t>&lt;nombre de variable&gt;.</a:t>
-            </a:r>
-            <a:r>
-              <a:rPr lang="es-ES" i="1" dirty="0" err="1"/>
-              <a:t>ToString</a:t>
-            </a:r>
-            <a:r>
-              <a:rPr lang="es-ES" i="1" dirty="0"/>
-              <a:t>();</a:t>
-            </a:r>
-          </a:p>
-          <a:p>
-            <a:r>
-              <a:rPr lang="es-ES" dirty="0"/>
-              <a:t>Convierte una variable de tipo </a:t>
-            </a:r>
-            <a:r>
-              <a:rPr lang="es-ES" b="1" dirty="0" err="1"/>
-              <a:t>DateTime</a:t>
-            </a:r>
-            <a:r>
-              <a:rPr lang="es-ES" b="1" dirty="0"/>
-              <a:t> </a:t>
-            </a:r>
-            <a:r>
-              <a:rPr lang="es-ES" dirty="0"/>
-              <a:t>a </a:t>
-            </a:r>
-            <a:r>
-              <a:rPr lang="es-ES" b="1" dirty="0" err="1"/>
-              <a:t>string</a:t>
-            </a:r>
-            <a:r>
-              <a:rPr lang="es-ES" dirty="0"/>
-              <a:t>:</a:t>
-            </a:r>
-          </a:p>
-          <a:p>
-            <a:pPr marL="457200" lvl="1" indent="0">
-              <a:buNone/>
-            </a:pPr>
-            <a:r>
-              <a:rPr lang="es-ES" i="1" dirty="0"/>
-              <a:t>&lt;nombre de variable&gt;.</a:t>
-            </a:r>
-            <a:r>
-              <a:rPr lang="es-ES" i="1" dirty="0" err="1"/>
-              <a:t>ToString</a:t>
-            </a:r>
-            <a:r>
-              <a:rPr lang="es-ES" i="1" dirty="0"/>
-              <a:t>();</a:t>
-            </a:r>
-          </a:p>
-          <a:p>
-            <a:endParaRPr lang="es-ES" dirty="0"/>
-          </a:p>
-          <a:p>
-            <a:endParaRPr lang="es-ES" dirty="0"/>
+              <a:t>Math</a:t>
+            </a:r>
+            <a:r>
+              <a:rPr lang="es-ES" dirty="0"/>
+              <a:t>.</a:t>
+            </a:r>
+          </a:p>
+          <a:p>
+            <a:pPr lvl="1"/>
+            <a:endParaRPr lang="es-ES" b="1" dirty="0"/>
           </a:p>
         </p:txBody>
       </p:sp>
     </p:spTree>
     <p:extLst>
       <p:ext uri="{BB962C8B-B14F-4D97-AF65-F5344CB8AC3E}">
-        <p14:creationId xmlns:p14="http://schemas.microsoft.com/office/powerpoint/2010/main" val="2593939620"/>
+        <p14:creationId xmlns:p14="http://schemas.microsoft.com/office/powerpoint/2010/main" val="3750576175"/>
       </p:ext>
     </p:extLst>
   </p:cSld>

</xml_diff>